<commit_message>
small change to Running_SU2 presentation
</commit_message>
<xml_diff>
--- a/Presentations/1st Workshop/Running_SU2.pptx
+++ b/Presentations/1st Workshop/Running_SU2.pptx
@@ -5,25 +5,26 @@
     <p:sldMasterId id="2147483648" r:id="rId1"/>
   </p:sldMasterIdLst>
   <p:notesMasterIdLst>
-    <p:notesMasterId r:id="rId15"/>
+    <p:notesMasterId r:id="rId16"/>
   </p:notesMasterIdLst>
   <p:handoutMasterIdLst>
-    <p:handoutMasterId r:id="rId16"/>
+    <p:handoutMasterId r:id="rId17"/>
   </p:handoutMasterIdLst>
   <p:sldIdLst>
     <p:sldId id="304" r:id="rId2"/>
     <p:sldId id="596" r:id="rId3"/>
-    <p:sldId id="612" r:id="rId4"/>
-    <p:sldId id="600" r:id="rId5"/>
-    <p:sldId id="601" r:id="rId6"/>
-    <p:sldId id="602" r:id="rId7"/>
-    <p:sldId id="603" r:id="rId8"/>
-    <p:sldId id="604" r:id="rId9"/>
-    <p:sldId id="605" r:id="rId10"/>
-    <p:sldId id="606" r:id="rId11"/>
-    <p:sldId id="607" r:id="rId12"/>
-    <p:sldId id="610" r:id="rId13"/>
-    <p:sldId id="611" r:id="rId14"/>
+    <p:sldId id="600" r:id="rId4"/>
+    <p:sldId id="601" r:id="rId5"/>
+    <p:sldId id="602" r:id="rId6"/>
+    <p:sldId id="603" r:id="rId7"/>
+    <p:sldId id="604" r:id="rId8"/>
+    <p:sldId id="605" r:id="rId9"/>
+    <p:sldId id="606" r:id="rId10"/>
+    <p:sldId id="607" r:id="rId11"/>
+    <p:sldId id="610" r:id="rId12"/>
+    <p:sldId id="611" r:id="rId13"/>
+    <p:sldId id="612" r:id="rId14"/>
+    <p:sldId id="613" r:id="rId15"/>
   </p:sldIdLst>
   <p:sldSz cx="9144000" cy="6858000" type="screen4x3"/>
   <p:notesSz cx="6858000" cy="9144000"/>
@@ -159,7 +160,6 @@
           <p14:sldIdLst>
             <p14:sldId id="304"/>
             <p14:sldId id="596"/>
-            <p14:sldId id="612"/>
             <p14:sldId id="600"/>
             <p14:sldId id="601"/>
             <p14:sldId id="602"/>
@@ -170,6 +170,8 @@
             <p14:sldId id="607"/>
             <p14:sldId id="610"/>
             <p14:sldId id="611"/>
+            <p14:sldId id="612"/>
+            <p14:sldId id="613"/>
           </p14:sldIdLst>
         </p14:section>
       </p14:sectionLst>
@@ -286,7 +288,7 @@
             </a:pPr>
             <a:fld id="{7469AA65-E62E-EF4B-AFC4-634F876BDCA0}" type="datetime1">
               <a:rPr lang="en-US" smtClean="0"/>
-              <a:t>9/26/2014</a:t>
+              <a:t>9/28/2014</a:t>
             </a:fld>
             <a:endParaRPr lang="en-US" dirty="0"/>
           </a:p>
@@ -507,7 +509,7 @@
             </a:pPr>
             <a:fld id="{2C82CE73-D806-024D-AFB1-8C2F723B5FB7}" type="datetime1">
               <a:rPr lang="en-US" smtClean="0"/>
-              <a:t>9/26/2014</a:t>
+              <a:t>9/28/2014</a:t>
             </a:fld>
             <a:endParaRPr lang="en-US" dirty="0"/>
           </a:p>
@@ -967,7 +969,7 @@
             <a:fld id="{42BE94EF-8A55-4945-808E-E03E18ED1A14}" type="slidenum">
               <a:rPr lang="en-US" smtClean="0"/>
               <a:pPr/>
-              <a:t>5</a:t>
+              <a:t>4</a:t>
             </a:fld>
             <a:endParaRPr lang="en-US"/>
           </a:p>
@@ -1049,7 +1051,7 @@
             <a:fld id="{42BE94EF-8A55-4945-808E-E03E18ED1A14}" type="slidenum">
               <a:rPr lang="en-US" smtClean="0"/>
               <a:pPr/>
-              <a:t>6</a:t>
+              <a:t>5</a:t>
             </a:fld>
             <a:endParaRPr lang="en-US"/>
           </a:p>
@@ -1131,7 +1133,7 @@
             <a:fld id="{42BE94EF-8A55-4945-808E-E03E18ED1A14}" type="slidenum">
               <a:rPr lang="en-US" smtClean="0"/>
               <a:pPr/>
-              <a:t>7</a:t>
+              <a:t>6</a:t>
             </a:fld>
             <a:endParaRPr lang="en-US"/>
           </a:p>
@@ -1213,7 +1215,7 @@
             <a:fld id="{42BE94EF-8A55-4945-808E-E03E18ED1A14}" type="slidenum">
               <a:rPr lang="en-US" smtClean="0"/>
               <a:pPr/>
-              <a:t>8</a:t>
+              <a:t>7</a:t>
             </a:fld>
             <a:endParaRPr lang="en-US"/>
           </a:p>
@@ -1414,7 +1416,7 @@
             <a:fld id="{42BE94EF-8A55-4945-808E-E03E18ED1A14}" type="slidenum">
               <a:rPr lang="en-US" smtClean="0"/>
               <a:pPr/>
-              <a:t>10</a:t>
+              <a:t>9</a:t>
             </a:fld>
             <a:endParaRPr lang="en-US"/>
           </a:p>
@@ -1565,7 +1567,7 @@
             <a:fld id="{42BE94EF-8A55-4945-808E-E03E18ED1A14}" type="slidenum">
               <a:rPr lang="en-US" smtClean="0"/>
               <a:pPr/>
-              <a:t>12</a:t>
+              <a:t>11</a:t>
             </a:fld>
             <a:endParaRPr lang="en-US"/>
           </a:p>
@@ -3603,7 +3605,7 @@
               </a14:hiddenLine>
             </a:ext>
             <a:ext uri="{FAA26D3D-D897-4be2-8F04-BA451C77F1D7}">
-              <ma14:placeholderFlag xmlns:ma14="http://schemas.microsoft.com/office/mac/drawingml/2011/main" xmlns="" val="1"/>
+              <ma14:placeholderFlag xmlns="" xmlns:ma14="http://schemas.microsoft.com/office/mac/drawingml/2011/main" val="1"/>
             </a:ext>
           </a:extLst>
         </p:spPr>
@@ -4521,7 +4523,7 @@
       </p:grpSpPr>
       <p:sp>
         <p:nvSpPr>
-          <p:cNvPr id="2" name="Título 1"/>
+          <p:cNvPr id="2" name="Title 1"/>
           <p:cNvSpPr>
             <a:spLocks noGrp="1"/>
           </p:cNvSpPr>
@@ -4535,20 +4537,16 @@
           <a:lstStyle/>
           <a:p>
             <a:r>
-              <a:rPr lang="en-US" dirty="0" err="1" smtClean="0"/>
-              <a:t>Adjoint</a:t>
-            </a:r>
-            <a:r>
               <a:rPr lang="en-US" dirty="0" smtClean="0"/>
-              <a:t> Solution</a:t>
-            </a:r>
-            <a:endParaRPr lang="en-US" sz="2400" dirty="0"/>
-          </a:p>
-        </p:txBody>
-      </p:sp>
-      <p:sp>
-        <p:nvSpPr>
-          <p:cNvPr id="4" name="Content Placeholder 3"/>
+              <a:t>Interactive</a:t>
+            </a:r>
+            <a:endParaRPr lang="en-US" dirty="0"/>
+          </a:p>
+        </p:txBody>
+      </p:sp>
+      <p:sp>
+        <p:nvSpPr>
+          <p:cNvPr id="3" name="Content Placeholder 2"/>
           <p:cNvSpPr>
             <a:spLocks noGrp="1"/>
           </p:cNvSpPr>
@@ -4566,239 +4564,34 @@
           </a:prstGeom>
         </p:spPr>
         <p:txBody>
-          <a:bodyPr vert="horz" lIns="0" tIns="45720" rIns="0" bIns="45720" rtlCol="0">
-            <a:normAutofit/>
-          </a:bodyPr>
+          <a:bodyPr/>
           <a:lstStyle/>
           <a:p>
             <a:r>
-              <a:rPr lang="en-US" dirty="0"/>
-              <a:t>Sensitivity of a functional to changes in the flow</a:t>
-            </a:r>
-          </a:p>
-          <a:p>
-            <a:pPr lvl="1"/>
-            <a:r>
-              <a:rPr lang="en-US" dirty="0"/>
-              <a:t>e</a:t>
-            </a:r>
-            <a:r>
-              <a:rPr lang="en-US" dirty="0"/>
-              <a:t>.g., How does changing the airfoil shape affect lift?</a:t>
-            </a:r>
-          </a:p>
-          <a:p>
-            <a:r>
-              <a:rPr lang="en-US" dirty="0"/>
-              <a:t>Additional required file:</a:t>
-            </a:r>
-          </a:p>
-          <a:p>
-            <a:pPr lvl="1"/>
-            <a:r>
-              <a:rPr lang="en-US" dirty="0"/>
-              <a:t>Converged flow solution</a:t>
+              <a:rPr lang="en-US" dirty="0" smtClean="0"/>
+              <a:t>Adjoint </a:t>
+            </a:r>
+            <a:r>
+              <a:rPr lang="en-US" dirty="0" smtClean="0"/>
+              <a:t>Solution Demonstration</a:t>
             </a:r>
             <a:endParaRPr lang="en-US" dirty="0"/>
           </a:p>
-          <a:p>
-            <a:r>
-              <a:rPr lang="en-US" dirty="0" err="1"/>
-              <a:t>Config</a:t>
-            </a:r>
-            <a:r>
-              <a:rPr lang="en-US" dirty="0"/>
-              <a:t> options:</a:t>
-            </a:r>
-            <a:endParaRPr lang="en-US" dirty="0"/>
-          </a:p>
-          <a:p>
-            <a:endParaRPr lang="en-US" dirty="0"/>
-          </a:p>
-        </p:txBody>
-      </p:sp>
-      <p:sp>
-        <p:nvSpPr>
-          <p:cNvPr id="7" name="TextBox 6"/>
-          <p:cNvSpPr txBox="1"/>
-          <p:nvPr/>
-        </p:nvSpPr>
-        <p:spPr>
-          <a:xfrm>
-            <a:off x="2245360" y="3269226"/>
-            <a:ext cx="4663440" cy="2031325"/>
-          </a:xfrm>
-          <a:prstGeom prst="rect">
-            <a:avLst/>
-          </a:prstGeom>
-          <a:ln/>
-        </p:spPr>
-        <p:style>
-          <a:lnRef idx="1">
-            <a:schemeClr val="dk1"/>
-          </a:lnRef>
-          <a:fillRef idx="2">
-            <a:schemeClr val="dk1"/>
-          </a:fillRef>
-          <a:effectRef idx="1">
-            <a:schemeClr val="dk1"/>
-          </a:effectRef>
-          <a:fontRef idx="minor">
-            <a:schemeClr val="dk1"/>
-          </a:fontRef>
-        </p:style>
-        <p:txBody>
-          <a:bodyPr wrap="square" rtlCol="0">
-            <a:spAutoFit/>
-          </a:bodyPr>
-          <a:lstStyle/>
-          <a:p>
-            <a:r>
-              <a:rPr lang="en-US" sz="1400" dirty="0">
-                <a:latin typeface="Courier"/>
-                <a:cs typeface="Courier"/>
-              </a:rPr>
-              <a:t>MATH_PROBLEM= </a:t>
-            </a:r>
-            <a:r>
-              <a:rPr lang="en-US" sz="1400" dirty="0" smtClean="0">
-                <a:latin typeface="Courier"/>
-                <a:cs typeface="Courier"/>
-              </a:rPr>
-              <a:t>ADJOINT</a:t>
-            </a:r>
-          </a:p>
-          <a:p>
-            <a:r>
-              <a:rPr lang="en-US" sz="1400" dirty="0" smtClean="0">
-                <a:latin typeface="Courier"/>
-                <a:cs typeface="Courier"/>
-              </a:rPr>
-              <a:t>%</a:t>
-            </a:r>
-          </a:p>
-          <a:p>
-            <a:r>
-              <a:rPr lang="en-US" sz="1400" dirty="0">
-                <a:latin typeface="Courier"/>
-                <a:cs typeface="Courier"/>
-              </a:rPr>
-              <a:t>RESTART_SOL= NO</a:t>
-            </a:r>
-          </a:p>
-          <a:p>
-            <a:r>
-              <a:rPr lang="en-US" sz="1400" dirty="0" smtClean="0">
-                <a:latin typeface="Courier"/>
-                <a:cs typeface="Courier"/>
-              </a:rPr>
-              <a:t>%</a:t>
-            </a:r>
-            <a:endParaRPr lang="en-US" sz="1400" dirty="0">
-              <a:latin typeface="Courier"/>
-              <a:cs typeface="Courier"/>
-            </a:endParaRPr>
-          </a:p>
-          <a:p>
-            <a:r>
-              <a:rPr lang="en-US" sz="1400" dirty="0">
-                <a:latin typeface="Courier"/>
-                <a:cs typeface="Courier"/>
-              </a:rPr>
-              <a:t>ADJOINT_TYPE= </a:t>
-            </a:r>
-            <a:r>
-              <a:rPr lang="en-US" sz="1400" dirty="0" smtClean="0">
-                <a:latin typeface="Courier"/>
-                <a:cs typeface="Courier"/>
-              </a:rPr>
-              <a:t>CONTINUOUS</a:t>
-            </a:r>
-          </a:p>
-          <a:p>
-            <a:r>
-              <a:rPr lang="en-US" sz="1400" dirty="0" smtClean="0">
-                <a:latin typeface="Courier"/>
-                <a:cs typeface="Courier"/>
-              </a:rPr>
-              <a:t>%</a:t>
-            </a:r>
-          </a:p>
-          <a:p>
-            <a:r>
-              <a:rPr lang="en-US" sz="1400" dirty="0">
-                <a:latin typeface="Courier"/>
-                <a:cs typeface="Courier"/>
-              </a:rPr>
-              <a:t>ADJ_OBJFUNC= </a:t>
-            </a:r>
-            <a:r>
-              <a:rPr lang="en-US" sz="1400" dirty="0" smtClean="0">
-                <a:latin typeface="Courier"/>
-                <a:cs typeface="Courier"/>
-              </a:rPr>
-              <a:t>DRAG</a:t>
-            </a:r>
-          </a:p>
-          <a:p>
-            <a:r>
-              <a:rPr lang="en-US" sz="1400" dirty="0" smtClean="0">
-                <a:latin typeface="Courier"/>
-                <a:cs typeface="Courier"/>
-              </a:rPr>
-              <a:t>%</a:t>
-            </a:r>
-          </a:p>
-          <a:p>
-            <a:r>
-              <a:rPr lang="pl-PL" sz="1400" dirty="0">
-                <a:latin typeface="Courier"/>
-                <a:cs typeface="Courier"/>
-              </a:rPr>
-              <a:t>SOLUTION_FLOW_FILENAME= </a:t>
-            </a:r>
-            <a:r>
-              <a:rPr lang="pl-PL" sz="1400" dirty="0" err="1" smtClean="0">
-                <a:latin typeface="Courier"/>
-                <a:cs typeface="Courier"/>
-              </a:rPr>
-              <a:t>solution_flow.dat</a:t>
-            </a:r>
-            <a:endParaRPr lang="pl-PL" sz="1400" dirty="0">
-              <a:latin typeface="Courier"/>
-              <a:cs typeface="Courier"/>
-            </a:endParaRPr>
-          </a:p>
         </p:txBody>
       </p:sp>
     </p:spTree>
-    <p:custDataLst>
-      <p:tags r:id="rId1"/>
-    </p:custDataLst>
     <p:extLst>
       <p:ext uri="{BB962C8B-B14F-4D97-AF65-F5344CB8AC3E}">
-        <p14:creationId xmlns:p14="http://schemas.microsoft.com/office/powerpoint/2010/main" val="1792451415"/>
+        <p14:creationId xmlns:p14="http://schemas.microsoft.com/office/powerpoint/2010/main" val="2802959953"/>
       </p:ext>
     </p:extLst>
   </p:cSld>
   <p:clrMapOvr>
     <a:masterClrMapping/>
   </p:clrMapOvr>
-  <mc:AlternateContent xmlns:mc="http://schemas.openxmlformats.org/markup-compatibility/2006" xmlns:p14="http://schemas.microsoft.com/office/powerpoint/2010/main">
-    <mc:Choice Requires="p14">
-      <p:transition spd="slow" p14:dur="2000" advTm="104325"/>
-    </mc:Choice>
-    <mc:Fallback xmlns:mv="urn:schemas-microsoft-com:mac:vml" xmlns="">
-      <p:transition spd="slow" advTm="104325"/>
-    </mc:Fallback>
-  </mc:AlternateContent>
-  <p:timing>
-    <p:tnLst>
-      <p:par>
-        <p:cTn id="1" dur="indefinite" restart="never" nodeType="tmRoot"/>
-      </p:par>
-    </p:tnLst>
-  </p:timing>
+  <p:transition spd="slow">
+    <p:fade/>
+  </p:transition>
 </p:sld>
 </file>
 
@@ -4821,7 +4614,7 @@
       </p:grpSpPr>
       <p:sp>
         <p:nvSpPr>
-          <p:cNvPr id="2" name="Title 1"/>
+          <p:cNvPr id="2" name="Título 1"/>
           <p:cNvSpPr>
             <a:spLocks noGrp="1"/>
           </p:cNvSpPr>
@@ -4836,15 +4629,15 @@
           <a:p>
             <a:r>
               <a:rPr lang="en-US" dirty="0" smtClean="0"/>
-              <a:t>Interactive</a:t>
-            </a:r>
-            <a:endParaRPr lang="en-US" dirty="0"/>
-          </a:p>
-        </p:txBody>
-      </p:sp>
-      <p:sp>
-        <p:nvSpPr>
-          <p:cNvPr id="3" name="Content Placeholder 2"/>
+              <a:t>Additional Resources</a:t>
+            </a:r>
+            <a:endParaRPr lang="en-US" sz="2400" dirty="0"/>
+          </a:p>
+        </p:txBody>
+      </p:sp>
+      <p:sp>
+        <p:nvSpPr>
+          <p:cNvPr id="4" name="Content Placeholder 3"/>
           <p:cNvSpPr>
             <a:spLocks noGrp="1"/>
           </p:cNvSpPr>
@@ -4862,30 +4655,127 @@
           </a:prstGeom>
         </p:spPr>
         <p:txBody>
-          <a:bodyPr/>
+          <a:bodyPr vert="horz" lIns="0" tIns="45720" rIns="0" bIns="45720" rtlCol="0">
+            <a:normAutofit/>
+          </a:bodyPr>
           <a:lstStyle/>
           <a:p>
             <a:r>
-              <a:rPr lang="en-US" dirty="0" smtClean="0"/>
-              <a:t>Adjoint Solution</a:t>
+              <a:rPr lang="en-US" dirty="0"/>
+              <a:t>Online documentation</a:t>
+            </a:r>
+          </a:p>
+          <a:p>
+            <a:pPr lvl="1"/>
+            <a:r>
+              <a:rPr lang="en-US" dirty="0"/>
+              <a:t>	http://su2.stanford.edu</a:t>
+            </a:r>
+          </a:p>
+          <a:p>
+            <a:r>
+              <a:rPr lang="en-US" dirty="0"/>
+              <a:t>Online tutorials</a:t>
+            </a:r>
+          </a:p>
+          <a:p>
+            <a:pPr lvl="1"/>
+            <a:r>
+              <a:rPr lang="en-US" dirty="0"/>
+              <a:t>	su2.stanford.edu &gt; Training</a:t>
+            </a:r>
+          </a:p>
+          <a:p>
+            <a:pPr lvl="1"/>
+            <a:r>
+              <a:rPr lang="en-US" dirty="0"/>
+              <a:t>	also accessible via su2.stanford.edu &gt; Guides &gt; User’s Tutorials</a:t>
+            </a:r>
+          </a:p>
+          <a:p>
+            <a:r>
+              <a:rPr lang="en-US" dirty="0" err="1"/>
+              <a:t>TestCases</a:t>
+            </a:r>
+            <a:r>
+              <a:rPr lang="en-US" dirty="0"/>
+              <a:t> directory</a:t>
+            </a:r>
+          </a:p>
+          <a:p>
+            <a:pPr lvl="1"/>
+            <a:r>
+              <a:rPr lang="en-US" dirty="0"/>
+              <a:t>	github.com/su2code/</a:t>
+            </a:r>
+            <a:r>
+              <a:rPr lang="en-US" dirty="0" err="1"/>
+              <a:t>TestCases</a:t>
+            </a:r>
+            <a:r>
+              <a:rPr lang="en-US" dirty="0"/>
+              <a:t>/</a:t>
+            </a:r>
+          </a:p>
+          <a:p>
+            <a:r>
+              <a:rPr lang="en-US" dirty="0"/>
+              <a:t>CFD Online forum</a:t>
+            </a:r>
+          </a:p>
+          <a:p>
+            <a:pPr lvl="1"/>
+            <a:r>
+              <a:rPr lang="en-US" dirty="0"/>
+              <a:t>	</a:t>
+            </a:r>
+            <a:r>
+              <a:rPr lang="nl-NL" dirty="0"/>
+              <a:t>http://</a:t>
+            </a:r>
+            <a:r>
+              <a:rPr lang="nl-NL" dirty="0" err="1"/>
+              <a:t>www.cfd-online.com</a:t>
+            </a:r>
+            <a:r>
+              <a:rPr lang="nl-NL" dirty="0"/>
+              <a:t>/Forums/su2/</a:t>
             </a:r>
             <a:endParaRPr lang="en-US" dirty="0"/>
           </a:p>
+          <a:p>
+            <a:endParaRPr lang="en-US" dirty="0"/>
+          </a:p>
         </p:txBody>
       </p:sp>
     </p:spTree>
+    <p:custDataLst>
+      <p:tags r:id="rId1"/>
+    </p:custDataLst>
     <p:extLst>
       <p:ext uri="{BB962C8B-B14F-4D97-AF65-F5344CB8AC3E}">
-        <p14:creationId xmlns:p14="http://schemas.microsoft.com/office/powerpoint/2010/main" val="2802959953"/>
+        <p14:creationId xmlns:p14="http://schemas.microsoft.com/office/powerpoint/2010/main" val="2167232642"/>
       </p:ext>
     </p:extLst>
   </p:cSld>
   <p:clrMapOvr>
     <a:masterClrMapping/>
   </p:clrMapOvr>
-  <p:transition spd="slow">
-    <p:fade/>
-  </p:transition>
+  <mc:AlternateContent xmlns:mc="http://schemas.openxmlformats.org/markup-compatibility/2006" xmlns:p14="http://schemas.microsoft.com/office/powerpoint/2010/main">
+    <mc:Choice Requires="p14">
+      <p:transition spd="slow" p14:dur="2000" advTm="104325"/>
+    </mc:Choice>
+    <mc:Fallback xmlns="" xmlns:mv="urn:schemas-microsoft-com:mac:vml">
+      <p:transition spd="slow" advTm="104325"/>
+    </mc:Fallback>
+  </mc:AlternateContent>
+  <p:timing>
+    <p:tnLst>
+      <p:par>
+        <p:cTn id="1" dur="indefinite" restart="never" nodeType="tmRoot"/>
+      </p:par>
+    </p:tnLst>
+  </p:timing>
 </p:sld>
 </file>
 
@@ -4908,7 +4798,7 @@
       </p:grpSpPr>
       <p:sp>
         <p:nvSpPr>
-          <p:cNvPr id="2" name="Título 1"/>
+          <p:cNvPr id="2" name="Title 1"/>
           <p:cNvSpPr>
             <a:spLocks noGrp="1"/>
           </p:cNvSpPr>
@@ -4923,174 +4813,44 @@
           <a:p>
             <a:r>
               <a:rPr lang="en-US" dirty="0" smtClean="0"/>
-              <a:t>Additional Resources</a:t>
-            </a:r>
-            <a:endParaRPr lang="en-US" sz="2400" dirty="0"/>
-          </a:p>
-        </p:txBody>
-      </p:sp>
-      <p:sp>
-        <p:nvSpPr>
-          <p:cNvPr id="4" name="Content Placeholder 3"/>
+              <a:t>Questions?</a:t>
+            </a:r>
+            <a:endParaRPr lang="en-US" dirty="0"/>
+          </a:p>
+        </p:txBody>
+      </p:sp>
+      <p:sp>
+        <p:nvSpPr>
+          <p:cNvPr id="3" name="Content Placeholder 2"/>
           <p:cNvSpPr>
             <a:spLocks noGrp="1"/>
           </p:cNvSpPr>
           <p:nvPr>
-            <p:ph idx="4294967295"/>
-          </p:nvPr>
-        </p:nvSpPr>
-        <p:spPr>
-          <a:xfrm>
-            <a:off x="685800" y="1295400"/>
-            <a:ext cx="7772400" cy="4800600"/>
-          </a:xfrm>
-          <a:prstGeom prst="rect">
-            <a:avLst/>
-          </a:prstGeom>
-        </p:spPr>
-        <p:txBody>
-          <a:bodyPr vert="horz" lIns="0" tIns="45720" rIns="0" bIns="45720" rtlCol="0">
-            <a:normAutofit/>
-          </a:bodyPr>
+            <p:ph sz="quarter" idx="10"/>
+          </p:nvPr>
+        </p:nvSpPr>
+        <p:spPr/>
+        <p:txBody>
+          <a:bodyPr/>
           <a:lstStyle/>
           <a:p>
-            <a:r>
-              <a:rPr lang="en-US" dirty="0"/>
-              <a:t>Online documentation</a:t>
-            </a:r>
-          </a:p>
-          <a:p>
-            <a:pPr lvl="1"/>
-            <a:r>
-              <a:rPr lang="en-US" dirty="0"/>
-              <a:t>	http</a:t>
-            </a:r>
-            <a:r>
-              <a:rPr lang="en-US" dirty="0"/>
-              <a:t>://su2.stanford.edu</a:t>
-            </a:r>
-            <a:endParaRPr lang="en-US" dirty="0"/>
-          </a:p>
-          <a:p>
-            <a:r>
-              <a:rPr lang="en-US" dirty="0"/>
-              <a:t>O</a:t>
-            </a:r>
-            <a:r>
-              <a:rPr lang="en-US" dirty="0"/>
-              <a:t>nline tutorials</a:t>
-            </a:r>
-          </a:p>
-          <a:p>
-            <a:pPr lvl="1"/>
-            <a:r>
-              <a:rPr lang="en-US" dirty="0"/>
-              <a:t>	su2.stanford.edu &gt; Training</a:t>
-            </a:r>
-          </a:p>
-          <a:p>
-            <a:pPr lvl="1"/>
-            <a:r>
-              <a:rPr lang="en-US" dirty="0"/>
-              <a:t>	</a:t>
-            </a:r>
-            <a:r>
-              <a:rPr lang="en-US" dirty="0"/>
-              <a:t>also </a:t>
-            </a:r>
-            <a:r>
-              <a:rPr lang="en-US" dirty="0"/>
-              <a:t>accessible via su2.stanford.edu &gt; Guides &gt; User’s </a:t>
-            </a:r>
-            <a:r>
-              <a:rPr lang="en-US" dirty="0"/>
-              <a:t>Tutorials</a:t>
-            </a:r>
-          </a:p>
-          <a:p>
-            <a:r>
-              <a:rPr lang="en-US" dirty="0" err="1"/>
-              <a:t>TestCases</a:t>
-            </a:r>
-            <a:r>
-              <a:rPr lang="en-US" dirty="0"/>
-              <a:t> directory</a:t>
-            </a:r>
-          </a:p>
-          <a:p>
-            <a:pPr lvl="1"/>
-            <a:r>
-              <a:rPr lang="en-US" dirty="0"/>
-              <a:t>	github.com/su2code/</a:t>
-            </a:r>
-            <a:r>
-              <a:rPr lang="en-US" dirty="0" err="1"/>
-              <a:t>TestCases</a:t>
-            </a:r>
-            <a:r>
-              <a:rPr lang="en-US" dirty="0"/>
-              <a:t>/</a:t>
-            </a:r>
-          </a:p>
-          <a:p>
-            <a:r>
-              <a:rPr lang="en-US" dirty="0"/>
-              <a:t>CFD Online forum</a:t>
-            </a:r>
-          </a:p>
-          <a:p>
-            <a:pPr lvl="1"/>
-            <a:r>
-              <a:rPr lang="en-US" dirty="0"/>
-              <a:t>	</a:t>
-            </a:r>
-            <a:r>
-              <a:rPr lang="nl-NL" dirty="0"/>
-              <a:t>http://</a:t>
-            </a:r>
-            <a:r>
-              <a:rPr lang="nl-NL" dirty="0" err="1"/>
-              <a:t>www.cfd-online.com</a:t>
-            </a:r>
-            <a:r>
-              <a:rPr lang="nl-NL" dirty="0"/>
-              <a:t>/Forums/su2/</a:t>
-            </a:r>
-            <a:endParaRPr lang="en-US" dirty="0"/>
-          </a:p>
-          <a:p>
-            <a:endParaRPr lang="en-US" dirty="0"/>
+            <a:endParaRPr lang="en-US"/>
           </a:p>
         </p:txBody>
       </p:sp>
     </p:spTree>
-    <p:custDataLst>
-      <p:tags r:id="rId1"/>
-    </p:custDataLst>
     <p:extLst>
       <p:ext uri="{BB962C8B-B14F-4D97-AF65-F5344CB8AC3E}">
-        <p14:creationId xmlns:p14="http://schemas.microsoft.com/office/powerpoint/2010/main" val="2167232642"/>
+        <p14:creationId xmlns:p14="http://schemas.microsoft.com/office/powerpoint/2010/main" val="4122828930"/>
       </p:ext>
     </p:extLst>
   </p:cSld>
   <p:clrMapOvr>
     <a:masterClrMapping/>
   </p:clrMapOvr>
-  <mc:AlternateContent xmlns:mc="http://schemas.openxmlformats.org/markup-compatibility/2006" xmlns:p14="http://schemas.microsoft.com/office/powerpoint/2010/main">
-    <mc:Choice Requires="p14">
-      <p:transition spd="slow" p14:dur="2000" advTm="104325"/>
-    </mc:Choice>
-    <mc:Fallback xmlns:mv="urn:schemas-microsoft-com:mac:vml" xmlns="">
-      <p:transition spd="slow" advTm="104325"/>
-    </mc:Fallback>
-  </mc:AlternateContent>
-  <p:timing>
-    <p:tnLst>
-      <p:par>
-        <p:cTn id="1" dur="indefinite" restart="never" nodeType="tmRoot"/>
-      </p:par>
-    </p:tnLst>
-  </p:timing>
+  <p:transition spd="slow">
+    <p:fade/>
+  </p:transition>
 </p:sld>
 </file>
 
@@ -5128,7 +4888,7 @@
           <a:p>
             <a:r>
               <a:rPr lang="en-US" dirty="0" smtClean="0"/>
-              <a:t>Questions?</a:t>
+              <a:t>Results: Direct Solution</a:t>
             </a:r>
             <a:endParaRPr lang="en-US" dirty="0"/>
           </a:p>
@@ -5149,14 +4909,281 @@
           <a:bodyPr/>
           <a:lstStyle/>
           <a:p>
-            <a:endParaRPr lang="en-US"/>
-          </a:p>
-        </p:txBody>
-      </p:sp>
+            <a:endParaRPr lang="en-US" dirty="0"/>
+          </a:p>
+        </p:txBody>
+      </p:sp>
+      <p:pic>
+        <p:nvPicPr>
+          <p:cNvPr id="1026" name="Picture 2"/>
+          <p:cNvPicPr>
+            <a:picLocks noChangeAspect="1" noChangeArrowheads="1"/>
+          </p:cNvPicPr>
+          <p:nvPr/>
+        </p:nvPicPr>
+        <p:blipFill>
+          <a:blip r:embed="rId2">
+            <a:extLst>
+              <a:ext uri="{28A0092B-C50C-407E-A947-70E740481C1C}">
+                <a14:useLocalDpi xmlns:a14="http://schemas.microsoft.com/office/drawing/2010/main" val="0"/>
+              </a:ext>
+            </a:extLst>
+          </a:blip>
+          <a:srcRect/>
+          <a:stretch>
+            <a:fillRect/>
+          </a:stretch>
+        </p:blipFill>
+        <p:spPr bwMode="auto">
+          <a:xfrm>
+            <a:off x="948776" y="1130087"/>
+            <a:ext cx="4659728" cy="3867636"/>
+          </a:xfrm>
+          <a:prstGeom prst="rect">
+            <a:avLst/>
+          </a:prstGeom>
+          <a:noFill/>
+          <a:ln>
+            <a:noFill/>
+          </a:ln>
+          <a:effectLst/>
+          <a:extLst>
+            <a:ext uri="{909E8E84-426E-40DD-AFC4-6F175D3DCCD1}">
+              <a14:hiddenFill xmlns:a14="http://schemas.microsoft.com/office/drawing/2010/main">
+                <a:solidFill>
+                  <a:schemeClr val="accent1"/>
+                </a:solidFill>
+              </a14:hiddenFill>
+            </a:ext>
+            <a:ext uri="{91240B29-F687-4F45-9708-019B960494DF}">
+              <a14:hiddenLine xmlns:a14="http://schemas.microsoft.com/office/drawing/2010/main" w="9525">
+                <a:solidFill>
+                  <a:schemeClr val="tx1"/>
+                </a:solidFill>
+                <a:miter lim="800000"/>
+                <a:headEnd/>
+                <a:tailEnd/>
+              </a14:hiddenLine>
+            </a:ext>
+            <a:ext uri="{AF507438-7753-43E0-B8FC-AC1667EBCBE1}">
+              <a14:hiddenEffects xmlns:a14="http://schemas.microsoft.com/office/drawing/2010/main">
+                <a:effectLst>
+                  <a:outerShdw dist="35921" dir="2700000" algn="ctr" rotWithShape="0">
+                    <a:schemeClr val="bg2"/>
+                  </a:outerShdw>
+                </a:effectLst>
+              </a14:hiddenEffects>
+            </a:ext>
+          </a:extLst>
+        </p:spPr>
+      </p:pic>
+      <p:pic>
+        <p:nvPicPr>
+          <p:cNvPr id="1027" name="Picture 3"/>
+          <p:cNvPicPr>
+            <a:picLocks noChangeAspect="1" noChangeArrowheads="1"/>
+          </p:cNvPicPr>
+          <p:nvPr/>
+        </p:nvPicPr>
+        <p:blipFill>
+          <a:blip r:embed="rId3">
+            <a:extLst>
+              <a:ext uri="{28A0092B-C50C-407E-A947-70E740481C1C}">
+                <a14:useLocalDpi xmlns:a14="http://schemas.microsoft.com/office/drawing/2010/main" val="0"/>
+              </a:ext>
+            </a:extLst>
+          </a:blip>
+          <a:srcRect/>
+          <a:stretch>
+            <a:fillRect/>
+          </a:stretch>
+        </p:blipFill>
+        <p:spPr bwMode="auto">
+          <a:xfrm>
+            <a:off x="5001208" y="2744146"/>
+            <a:ext cx="3796295" cy="3479490"/>
+          </a:xfrm>
+          <a:prstGeom prst="rect">
+            <a:avLst/>
+          </a:prstGeom>
+          <a:noFill/>
+          <a:ln>
+            <a:noFill/>
+          </a:ln>
+          <a:effectLst/>
+          <a:extLst>
+            <a:ext uri="{909E8E84-426E-40DD-AFC4-6F175D3DCCD1}">
+              <a14:hiddenFill xmlns:a14="http://schemas.microsoft.com/office/drawing/2010/main">
+                <a:solidFill>
+                  <a:schemeClr val="accent1"/>
+                </a:solidFill>
+              </a14:hiddenFill>
+            </a:ext>
+            <a:ext uri="{91240B29-F687-4F45-9708-019B960494DF}">
+              <a14:hiddenLine xmlns:a14="http://schemas.microsoft.com/office/drawing/2010/main" w="9525">
+                <a:solidFill>
+                  <a:schemeClr val="tx1"/>
+                </a:solidFill>
+                <a:miter lim="800000"/>
+                <a:headEnd/>
+                <a:tailEnd/>
+              </a14:hiddenLine>
+            </a:ext>
+            <a:ext uri="{AF507438-7753-43E0-B8FC-AC1667EBCBE1}">
+              <a14:hiddenEffects xmlns:a14="http://schemas.microsoft.com/office/drawing/2010/main">
+                <a:effectLst>
+                  <a:outerShdw dist="35921" dir="2700000" algn="ctr" rotWithShape="0">
+                    <a:schemeClr val="bg2"/>
+                  </a:outerShdw>
+                </a:effectLst>
+              </a14:hiddenEffects>
+            </a:ext>
+          </a:extLst>
+        </p:spPr>
+      </p:pic>
     </p:spTree>
     <p:extLst>
       <p:ext uri="{BB962C8B-B14F-4D97-AF65-F5344CB8AC3E}">
-        <p14:creationId xmlns:p14="http://schemas.microsoft.com/office/powerpoint/2010/main" val="4122828930"/>
+        <p14:creationId xmlns:p14="http://schemas.microsoft.com/office/powerpoint/2010/main" val="3583471977"/>
+      </p:ext>
+    </p:extLst>
+  </p:cSld>
+  <p:clrMapOvr>
+    <a:masterClrMapping/>
+  </p:clrMapOvr>
+  <p:transition spd="slow">
+    <p:fade/>
+  </p:transition>
+</p:sld>
+</file>
+
+<file path=ppt/slides/slide14.xml><?xml version="1.0" encoding="utf-8"?>
+<p:sld xmlns:a="http://schemas.openxmlformats.org/drawingml/2006/main" xmlns:r="http://schemas.openxmlformats.org/officeDocument/2006/relationships" xmlns:p="http://schemas.openxmlformats.org/presentationml/2006/main">
+  <p:cSld>
+    <p:spTree>
+      <p:nvGrpSpPr>
+        <p:cNvPr id="1" name=""/>
+        <p:cNvGrpSpPr/>
+        <p:nvPr/>
+      </p:nvGrpSpPr>
+      <p:grpSpPr>
+        <a:xfrm>
+          <a:off x="0" y="0"/>
+          <a:ext cx="0" cy="0"/>
+          <a:chOff x="0" y="0"/>
+          <a:chExt cx="0" cy="0"/>
+        </a:xfrm>
+      </p:grpSpPr>
+      <p:sp>
+        <p:nvSpPr>
+          <p:cNvPr id="2" name="Title 1"/>
+          <p:cNvSpPr>
+            <a:spLocks noGrp="1"/>
+          </p:cNvSpPr>
+          <p:nvPr>
+            <p:ph type="title"/>
+          </p:nvPr>
+        </p:nvSpPr>
+        <p:spPr/>
+        <p:txBody>
+          <a:bodyPr/>
+          <a:lstStyle/>
+          <a:p>
+            <a:r>
+              <a:rPr lang="en-US" dirty="0" smtClean="0"/>
+              <a:t>Results: Adjoint Solution</a:t>
+            </a:r>
+            <a:endParaRPr lang="en-US" dirty="0"/>
+          </a:p>
+        </p:txBody>
+      </p:sp>
+      <p:sp>
+        <p:nvSpPr>
+          <p:cNvPr id="3" name="Content Placeholder 2"/>
+          <p:cNvSpPr>
+            <a:spLocks noGrp="1"/>
+          </p:cNvSpPr>
+          <p:nvPr>
+            <p:ph sz="quarter" idx="10"/>
+          </p:nvPr>
+        </p:nvSpPr>
+        <p:spPr/>
+        <p:txBody>
+          <a:bodyPr/>
+          <a:lstStyle/>
+          <a:p>
+            <a:endParaRPr lang="en-US"/>
+          </a:p>
+        </p:txBody>
+      </p:sp>
+      <p:pic>
+        <p:nvPicPr>
+          <p:cNvPr id="2050" name="Picture 2"/>
+          <p:cNvPicPr>
+            <a:picLocks noChangeAspect="1" noChangeArrowheads="1"/>
+          </p:cNvPicPr>
+          <p:nvPr/>
+        </p:nvPicPr>
+        <p:blipFill>
+          <a:blip r:embed="rId2">
+            <a:extLst>
+              <a:ext uri="{28A0092B-C50C-407E-A947-70E740481C1C}">
+                <a14:useLocalDpi xmlns:a14="http://schemas.microsoft.com/office/drawing/2010/main" val="0"/>
+              </a:ext>
+            </a:extLst>
+          </a:blip>
+          <a:srcRect/>
+          <a:stretch>
+            <a:fillRect/>
+          </a:stretch>
+        </p:blipFill>
+        <p:spPr bwMode="auto">
+          <a:xfrm>
+            <a:off x="2297179" y="1343608"/>
+            <a:ext cx="5031832" cy="4644216"/>
+          </a:xfrm>
+          <a:prstGeom prst="rect">
+            <a:avLst/>
+          </a:prstGeom>
+          <a:noFill/>
+          <a:ln>
+            <a:noFill/>
+          </a:ln>
+          <a:effectLst/>
+          <a:extLst>
+            <a:ext uri="{909E8E84-426E-40DD-AFC4-6F175D3DCCD1}">
+              <a14:hiddenFill xmlns:a14="http://schemas.microsoft.com/office/drawing/2010/main">
+                <a:solidFill>
+                  <a:schemeClr val="accent1"/>
+                </a:solidFill>
+              </a14:hiddenFill>
+            </a:ext>
+            <a:ext uri="{91240B29-F687-4F45-9708-019B960494DF}">
+              <a14:hiddenLine xmlns:a14="http://schemas.microsoft.com/office/drawing/2010/main" w="9525">
+                <a:solidFill>
+                  <a:schemeClr val="tx1"/>
+                </a:solidFill>
+                <a:miter lim="800000"/>
+                <a:headEnd/>
+                <a:tailEnd/>
+              </a14:hiddenLine>
+            </a:ext>
+            <a:ext uri="{AF507438-7753-43E0-B8FC-AC1667EBCBE1}">
+              <a14:hiddenEffects xmlns:a14="http://schemas.microsoft.com/office/drawing/2010/main">
+                <a:effectLst>
+                  <a:outerShdw dist="35921" dir="2700000" algn="ctr" rotWithShape="0">
+                    <a:schemeClr val="bg2"/>
+                  </a:outerShdw>
+                </a:effectLst>
+              </a14:hiddenEffects>
+            </a:ext>
+          </a:extLst>
+        </p:spPr>
+      </p:pic>
+    </p:spTree>
+    <p:extLst>
+      <p:ext uri="{BB962C8B-B14F-4D97-AF65-F5344CB8AC3E}">
+        <p14:creationId xmlns:p14="http://schemas.microsoft.com/office/powerpoint/2010/main" val="343495701"/>
       </p:ext>
     </p:extLst>
   </p:cSld>
@@ -5307,7 +5334,7 @@
       </p:grpSpPr>
       <p:sp>
         <p:nvSpPr>
-          <p:cNvPr id="3" name="Title 2"/>
+          <p:cNvPr id="2" name="Title 1"/>
           <p:cNvSpPr>
             <a:spLocks noGrp="1"/>
           </p:cNvSpPr>
@@ -5320,13 +5347,21 @@
           <a:bodyPr/>
           <a:lstStyle/>
           <a:p>
-            <a:endParaRPr lang="en-US"/>
-          </a:p>
-        </p:txBody>
-      </p:sp>
-      <p:sp>
-        <p:nvSpPr>
-          <p:cNvPr id="4" name="Content Placeholder 3"/>
+            <a:r>
+              <a:rPr lang="en-US" dirty="0" smtClean="0"/>
+              <a:t>Running Simulations with SU</a:t>
+            </a:r>
+            <a:r>
+              <a:rPr lang="en-US" baseline="30000" dirty="0" smtClean="0"/>
+              <a:t>2</a:t>
+            </a:r>
+            <a:endParaRPr lang="en-US" baseline="30000" dirty="0"/>
+          </a:p>
+        </p:txBody>
+      </p:sp>
+      <p:sp>
+        <p:nvSpPr>
+          <p:cNvPr id="6" name="Content Placeholder 3"/>
           <p:cNvSpPr>
             <a:spLocks noGrp="1"/>
           </p:cNvSpPr>
@@ -5336,17 +5371,75 @@
         </p:nvSpPr>
         <p:spPr/>
         <p:txBody>
-          <a:bodyPr/>
+          <a:bodyPr vert="horz" lIns="0" tIns="45720" rIns="0" bIns="45720" rtlCol="0">
+            <a:normAutofit/>
+          </a:bodyPr>
           <a:lstStyle/>
           <a:p>
-            <a:endParaRPr lang="en-US"/>
+            <a:r>
+              <a:rPr lang="en-US" dirty="0"/>
+              <a:t>What do I need to run simulations with SU2?</a:t>
+            </a:r>
+          </a:p>
+          <a:p>
+            <a:pPr lvl="1"/>
+            <a:r>
+              <a:rPr lang="en-US" dirty="0"/>
+              <a:t>Configuration file (.</a:t>
+            </a:r>
+            <a:r>
+              <a:rPr lang="en-US" dirty="0" err="1"/>
+              <a:t>cfg</a:t>
+            </a:r>
+            <a:r>
+              <a:rPr lang="en-US" dirty="0"/>
+              <a:t>)</a:t>
+            </a:r>
+          </a:p>
+          <a:p>
+            <a:pPr lvl="1"/>
+            <a:r>
+              <a:rPr lang="en-US" dirty="0"/>
+              <a:t>Mesh file (.su2 or .</a:t>
+            </a:r>
+            <a:r>
+              <a:rPr lang="en-US" dirty="0" err="1"/>
+              <a:t>cgns</a:t>
+            </a:r>
+            <a:r>
+              <a:rPr lang="en-US" dirty="0"/>
+              <a:t>)</a:t>
+            </a:r>
+          </a:p>
+          <a:p>
+            <a:r>
+              <a:rPr lang="en-US" dirty="0"/>
+              <a:t>This session will use:</a:t>
+            </a:r>
+          </a:p>
+          <a:p>
+            <a:pPr lvl="1"/>
+            <a:r>
+              <a:rPr lang="en-US" dirty="0"/>
+              <a:t>Lam_NACA0012.cfg</a:t>
+            </a:r>
+          </a:p>
+          <a:p>
+            <a:pPr lvl="1"/>
+            <a:r>
+              <a:rPr lang="en-US" dirty="0"/>
+              <a:t>Mesh_NACA0012_lam_omesh.su2</a:t>
+            </a:r>
+          </a:p>
+          <a:p>
+            <a:endParaRPr lang="en-US" dirty="0"/>
           </a:p>
         </p:txBody>
       </p:sp>
     </p:spTree>
     <p:extLst>
       <p:ext uri="{BB962C8B-B14F-4D97-AF65-F5344CB8AC3E}">
-        <p14:creationId xmlns:p14="http://schemas.microsoft.com/office/powerpoint/2010/main" val="1492631549"/>
+        <p14:creationId xmlns:p14="http://schemas.microsoft.com/office/powerpoint/2010/main" val="1913221959"/>
       </p:ext>
     </p:extLst>
   </p:cSld>
@@ -5378,7 +5471,7 @@
       </p:grpSpPr>
       <p:sp>
         <p:nvSpPr>
-          <p:cNvPr id="2" name="Title 1"/>
+          <p:cNvPr id="2" name="Título 1"/>
           <p:cNvSpPr>
             <a:spLocks noGrp="1"/>
           </p:cNvSpPr>
@@ -5393,148 +5486,7 @@
           <a:p>
             <a:r>
               <a:rPr lang="en-US" dirty="0" smtClean="0"/>
-              <a:t>Running Simulations with SU</a:t>
-            </a:r>
-            <a:r>
-              <a:rPr lang="en-US" baseline="30000" dirty="0" smtClean="0"/>
-              <a:t>2</a:t>
-            </a:r>
-            <a:endParaRPr lang="en-US" baseline="30000" dirty="0"/>
-          </a:p>
-        </p:txBody>
-      </p:sp>
-      <p:sp>
-        <p:nvSpPr>
-          <p:cNvPr id="6" name="Content Placeholder 3"/>
-          <p:cNvSpPr>
-            <a:spLocks noGrp="1"/>
-          </p:cNvSpPr>
-          <p:nvPr>
-            <p:ph sz="quarter" idx="10"/>
-          </p:nvPr>
-        </p:nvSpPr>
-        <p:spPr/>
-        <p:txBody>
-          <a:bodyPr vert="horz" lIns="0" tIns="45720" rIns="0" bIns="45720" rtlCol="0">
-            <a:normAutofit/>
-          </a:bodyPr>
-          <a:lstStyle/>
-          <a:p>
-            <a:r>
-              <a:rPr lang="en-US" dirty="0"/>
-              <a:t>What do I need to run simulations with SU2?</a:t>
-            </a:r>
-          </a:p>
-          <a:p>
-            <a:pPr lvl="1"/>
-            <a:r>
-              <a:rPr lang="en-US" dirty="0"/>
-              <a:t>Configuration file (.</a:t>
-            </a:r>
-            <a:r>
-              <a:rPr lang="en-US" dirty="0" err="1"/>
-              <a:t>cfg</a:t>
-            </a:r>
-            <a:r>
-              <a:rPr lang="en-US" dirty="0"/>
-              <a:t>)</a:t>
-            </a:r>
-          </a:p>
-          <a:p>
-            <a:pPr lvl="1"/>
-            <a:r>
-              <a:rPr lang="en-US" dirty="0"/>
-              <a:t>Mesh file (.su2 or .</a:t>
-            </a:r>
-            <a:r>
-              <a:rPr lang="en-US" dirty="0" err="1"/>
-              <a:t>cgns</a:t>
-            </a:r>
-            <a:r>
-              <a:rPr lang="en-US" dirty="0"/>
-              <a:t>)</a:t>
-            </a:r>
-          </a:p>
-          <a:p>
-            <a:r>
-              <a:rPr lang="en-US" dirty="0"/>
-              <a:t>This session will use:</a:t>
-            </a:r>
-          </a:p>
-          <a:p>
-            <a:pPr lvl="1"/>
-            <a:r>
-              <a:rPr lang="en-US" dirty="0"/>
-              <a:t>Lam_NACA0012.cfg</a:t>
-            </a:r>
-          </a:p>
-          <a:p>
-            <a:pPr lvl="1"/>
-            <a:r>
-              <a:rPr lang="en-US" dirty="0"/>
-              <a:t>Mesh_NACA0012_lam_omesh.su2</a:t>
-            </a:r>
-          </a:p>
-          <a:p>
-            <a:endParaRPr lang="en-US" dirty="0"/>
-          </a:p>
-        </p:txBody>
-      </p:sp>
-    </p:spTree>
-    <p:extLst>
-      <p:ext uri="{BB962C8B-B14F-4D97-AF65-F5344CB8AC3E}">
-        <p14:creationId xmlns:p14="http://schemas.microsoft.com/office/powerpoint/2010/main" val="1913221959"/>
-      </p:ext>
-    </p:extLst>
-  </p:cSld>
-  <p:clrMapOvr>
-    <a:masterClrMapping/>
-  </p:clrMapOvr>
-  <p:transition spd="slow">
-    <p:fade/>
-  </p:transition>
-</p:sld>
-</file>
-
-<file path=ppt/slides/slide5.xml><?xml version="1.0" encoding="utf-8"?>
-<p:sld xmlns:a="http://schemas.openxmlformats.org/drawingml/2006/main" xmlns:r="http://schemas.openxmlformats.org/officeDocument/2006/relationships" xmlns:p="http://schemas.openxmlformats.org/presentationml/2006/main">
-  <p:cSld>
-    <p:spTree>
-      <p:nvGrpSpPr>
-        <p:cNvPr id="1" name=""/>
-        <p:cNvGrpSpPr/>
-        <p:nvPr/>
-      </p:nvGrpSpPr>
-      <p:grpSpPr>
-        <a:xfrm>
-          <a:off x="0" y="0"/>
-          <a:ext cx="0" cy="0"/>
-          <a:chOff x="0" y="0"/>
-          <a:chExt cx="0" cy="0"/>
-        </a:xfrm>
-      </p:grpSpPr>
-      <p:sp>
-        <p:nvSpPr>
-          <p:cNvPr id="2" name="Título 1"/>
-          <p:cNvSpPr>
-            <a:spLocks noGrp="1"/>
-          </p:cNvSpPr>
-          <p:nvPr>
-            <p:ph type="title"/>
-          </p:nvPr>
-        </p:nvSpPr>
-        <p:spPr/>
-        <p:txBody>
-          <a:bodyPr/>
-          <a:lstStyle/>
-          <a:p>
-            <a:r>
-              <a:rPr lang="en-US" dirty="0" smtClean="0"/>
               <a:t>Quick Start Tutorial</a:t>
-            </a:r>
-            <a:r>
-              <a:rPr lang="en-US" dirty="0" smtClean="0"/>
-              <a:t/>
             </a:r>
             <a:br>
               <a:rPr lang="en-US" dirty="0" smtClean="0"/>
@@ -5573,7 +5525,7 @@
             <a:fld id="{13327632-CE63-A847-914F-A1F825E2A685}" type="slidenum">
               <a:rPr lang="en-US" smtClean="0"/>
               <a:pPr/>
-              <a:t>5</a:t>
+              <a:t>4</a:t>
             </a:fld>
             <a:endParaRPr lang="en-US"/>
           </a:p>
@@ -5634,7 +5586,11 @@
           <a:p>
             <a:r>
               <a:rPr lang="en-US" dirty="0"/>
-              <a:t>Angle of attack = 1.0o</a:t>
+              <a:t>Angle of attack = 1.0</a:t>
+            </a:r>
+            <a:r>
+              <a:rPr lang="en-US" baseline="30000" dirty="0"/>
+              <a:t>o</a:t>
             </a:r>
           </a:p>
           <a:p>
@@ -5750,7 +5706,389 @@
     <mc:Choice Requires="p14">
       <p:transition spd="slow" p14:dur="2000" advTm="104325"/>
     </mc:Choice>
-    <mc:Fallback xmlns:mv="urn:schemas-microsoft-com:mac:vml" xmlns="">
+    <mc:Fallback xmlns="" xmlns:mv="urn:schemas-microsoft-com:mac:vml">
+      <p:transition spd="slow" advTm="104325"/>
+    </mc:Fallback>
+  </mc:AlternateContent>
+  <p:timing>
+    <p:tnLst>
+      <p:par>
+        <p:cTn id="1" dur="indefinite" restart="never" nodeType="tmRoot"/>
+      </p:par>
+    </p:tnLst>
+  </p:timing>
+</p:sld>
+</file>
+
+<file path=ppt/slides/slide5.xml><?xml version="1.0" encoding="utf-8"?>
+<p:sld xmlns:a="http://schemas.openxmlformats.org/drawingml/2006/main" xmlns:r="http://schemas.openxmlformats.org/officeDocument/2006/relationships" xmlns:p="http://schemas.openxmlformats.org/presentationml/2006/main">
+  <p:cSld>
+    <p:spTree>
+      <p:nvGrpSpPr>
+        <p:cNvPr id="1" name=""/>
+        <p:cNvGrpSpPr/>
+        <p:nvPr/>
+      </p:nvGrpSpPr>
+      <p:grpSpPr>
+        <a:xfrm>
+          <a:off x="0" y="0"/>
+          <a:ext cx="0" cy="0"/>
+          <a:chOff x="0" y="0"/>
+          <a:chExt cx="0" cy="0"/>
+        </a:xfrm>
+      </p:grpSpPr>
+      <p:sp>
+        <p:nvSpPr>
+          <p:cNvPr id="2" name="Título 1"/>
+          <p:cNvSpPr>
+            <a:spLocks noGrp="1"/>
+          </p:cNvSpPr>
+          <p:nvPr>
+            <p:ph type="title"/>
+          </p:nvPr>
+        </p:nvSpPr>
+        <p:spPr/>
+        <p:txBody>
+          <a:bodyPr/>
+          <a:lstStyle/>
+          <a:p>
+            <a:r>
+              <a:rPr lang="en-US" dirty="0" smtClean="0"/>
+              <a:t>Flow Solution</a:t>
+            </a:r>
+            <a:endParaRPr lang="en-US" sz="2400" dirty="0"/>
+          </a:p>
+        </p:txBody>
+      </p:sp>
+      <p:sp>
+        <p:nvSpPr>
+          <p:cNvPr id="4" name="Content Placeholder 3"/>
+          <p:cNvSpPr>
+            <a:spLocks noGrp="1"/>
+          </p:cNvSpPr>
+          <p:nvPr>
+            <p:ph idx="4294967295"/>
+          </p:nvPr>
+        </p:nvSpPr>
+        <p:spPr>
+          <a:xfrm>
+            <a:off x="884238" y="1152026"/>
+            <a:ext cx="7772400" cy="4800600"/>
+          </a:xfrm>
+          <a:prstGeom prst="rect">
+            <a:avLst/>
+          </a:prstGeom>
+        </p:spPr>
+        <p:txBody>
+          <a:bodyPr vert="horz" lIns="0" tIns="45720" rIns="0" bIns="45720" rtlCol="0">
+            <a:normAutofit/>
+          </a:bodyPr>
+          <a:lstStyle/>
+          <a:p>
+            <a:r>
+              <a:rPr lang="en-US" dirty="0" err="1"/>
+              <a:t>Config</a:t>
+            </a:r>
+            <a:r>
+              <a:rPr lang="en-US" dirty="0"/>
+              <a:t> options:</a:t>
+            </a:r>
+          </a:p>
+          <a:p>
+            <a:endParaRPr lang="en-US" dirty="0"/>
+          </a:p>
+          <a:p>
+            <a:endParaRPr lang="en-US" dirty="0"/>
+          </a:p>
+          <a:p>
+            <a:endParaRPr lang="en-US" dirty="0"/>
+          </a:p>
+          <a:p>
+            <a:endParaRPr lang="en-US" dirty="0"/>
+          </a:p>
+          <a:p>
+            <a:endParaRPr lang="en-US" dirty="0" smtClean="0"/>
+          </a:p>
+          <a:p>
+            <a:endParaRPr lang="en-US" dirty="0"/>
+          </a:p>
+          <a:p>
+            <a:endParaRPr lang="en-US" dirty="0" smtClean="0"/>
+          </a:p>
+          <a:p>
+            <a:endParaRPr lang="en-US" dirty="0"/>
+          </a:p>
+          <a:p>
+            <a:endParaRPr lang="en-US" dirty="0"/>
+          </a:p>
+          <a:p>
+            <a:endParaRPr lang="en-US" dirty="0"/>
+          </a:p>
+          <a:p>
+            <a:endParaRPr lang="en-US" dirty="0"/>
+          </a:p>
+          <a:p>
+            <a:r>
+              <a:rPr lang="en-US" dirty="0"/>
+              <a:t>Most parameters have default values</a:t>
+            </a:r>
+          </a:p>
+          <a:p>
+            <a:r>
+              <a:rPr lang="en-US" dirty="0"/>
+              <a:t>The order of </a:t>
+            </a:r>
+            <a:r>
+              <a:rPr lang="en-US" dirty="0" err="1"/>
+              <a:t>config</a:t>
+            </a:r>
+            <a:r>
+              <a:rPr lang="en-US" dirty="0"/>
+              <a:t> options is not important</a:t>
+            </a:r>
+          </a:p>
+        </p:txBody>
+      </p:sp>
+      <p:sp>
+        <p:nvSpPr>
+          <p:cNvPr id="7" name="TextBox 6"/>
+          <p:cNvSpPr txBox="1"/>
+          <p:nvPr/>
+        </p:nvSpPr>
+        <p:spPr>
+          <a:xfrm>
+            <a:off x="2168013" y="2042160"/>
+            <a:ext cx="5214702" cy="2893100"/>
+          </a:xfrm>
+          <a:prstGeom prst="rect">
+            <a:avLst/>
+          </a:prstGeom>
+          <a:ln/>
+        </p:spPr>
+        <p:style>
+          <a:lnRef idx="1">
+            <a:schemeClr val="dk1"/>
+          </a:lnRef>
+          <a:fillRef idx="2">
+            <a:schemeClr val="dk1"/>
+          </a:fillRef>
+          <a:effectRef idx="1">
+            <a:schemeClr val="dk1"/>
+          </a:effectRef>
+          <a:fontRef idx="minor">
+            <a:schemeClr val="dk1"/>
+          </a:fontRef>
+        </p:style>
+        <p:txBody>
+          <a:bodyPr wrap="square" rtlCol="0">
+            <a:spAutoFit/>
+          </a:bodyPr>
+          <a:lstStyle/>
+          <a:p>
+            <a:r>
+              <a:rPr lang="en-US" sz="1400" dirty="0" smtClean="0">
+                <a:latin typeface="Courier"/>
+                <a:cs typeface="Courier"/>
+              </a:rPr>
+              <a:t>PHYSICAL_PROBLEM</a:t>
+            </a:r>
+            <a:r>
+              <a:rPr lang="en-US" sz="1400" dirty="0">
+                <a:latin typeface="Courier"/>
+                <a:cs typeface="Courier"/>
+              </a:rPr>
+              <a:t>= </a:t>
+            </a:r>
+            <a:r>
+              <a:rPr lang="en-US" sz="1400" dirty="0" smtClean="0">
+                <a:latin typeface="Courier"/>
+                <a:cs typeface="Courier"/>
+              </a:rPr>
+              <a:t>NAVIER_STOKES</a:t>
+            </a:r>
+          </a:p>
+          <a:p>
+            <a:r>
+              <a:rPr lang="en-US" sz="1400" dirty="0" smtClean="0">
+                <a:latin typeface="Courier"/>
+                <a:cs typeface="Courier"/>
+              </a:rPr>
+              <a:t>%</a:t>
+            </a:r>
+          </a:p>
+          <a:p>
+            <a:r>
+              <a:rPr lang="en-US" sz="1400" dirty="0">
+                <a:latin typeface="Courier"/>
+                <a:cs typeface="Courier"/>
+              </a:rPr>
+              <a:t>MATH_PROBLEM= DIRECT</a:t>
+            </a:r>
+          </a:p>
+          <a:p>
+            <a:r>
+              <a:rPr lang="en-US" sz="1400" dirty="0" smtClean="0">
+                <a:latin typeface="Courier"/>
+                <a:cs typeface="Courier"/>
+              </a:rPr>
+              <a:t>%</a:t>
+            </a:r>
+          </a:p>
+          <a:p>
+            <a:r>
+              <a:rPr lang="en-US" sz="1400" dirty="0" smtClean="0">
+                <a:latin typeface="Courier"/>
+                <a:cs typeface="Courier"/>
+              </a:rPr>
+              <a:t>MACH_NUMBER</a:t>
+            </a:r>
+            <a:r>
+              <a:rPr lang="en-US" sz="1400" dirty="0">
+                <a:latin typeface="Courier"/>
+                <a:cs typeface="Courier"/>
+              </a:rPr>
+              <a:t>= </a:t>
+            </a:r>
+            <a:r>
+              <a:rPr lang="en-US" sz="1400" dirty="0" smtClean="0">
+                <a:latin typeface="Courier"/>
+                <a:cs typeface="Courier"/>
+              </a:rPr>
+              <a:t>0.5</a:t>
+            </a:r>
+            <a:endParaRPr lang="en-US" sz="1400" dirty="0">
+              <a:latin typeface="Courier"/>
+              <a:cs typeface="Courier"/>
+            </a:endParaRPr>
+          </a:p>
+          <a:p>
+            <a:r>
+              <a:rPr lang="en-US" sz="1400" dirty="0" smtClean="0">
+                <a:latin typeface="Courier"/>
+                <a:cs typeface="Courier"/>
+              </a:rPr>
+              <a:t>%</a:t>
+            </a:r>
+          </a:p>
+          <a:p>
+            <a:r>
+              <a:rPr lang="en-US" sz="1400" dirty="0" err="1" smtClean="0">
+                <a:latin typeface="Courier"/>
+                <a:cs typeface="Courier"/>
+              </a:rPr>
+              <a:t>AoA</a:t>
+            </a:r>
+            <a:r>
+              <a:rPr lang="en-US" sz="1400" dirty="0">
+                <a:latin typeface="Courier"/>
+                <a:cs typeface="Courier"/>
+              </a:rPr>
+              <a:t>= </a:t>
+            </a:r>
+            <a:r>
+              <a:rPr lang="en-US" sz="1400" dirty="0" smtClean="0">
+                <a:latin typeface="Courier"/>
+                <a:cs typeface="Courier"/>
+              </a:rPr>
+              <a:t>1.00</a:t>
+            </a:r>
+            <a:endParaRPr lang="en-US" sz="1400" dirty="0">
+              <a:latin typeface="Courier"/>
+              <a:cs typeface="Courier"/>
+            </a:endParaRPr>
+          </a:p>
+          <a:p>
+            <a:r>
+              <a:rPr lang="en-US" sz="1400" dirty="0" smtClean="0">
+                <a:latin typeface="Courier"/>
+                <a:cs typeface="Courier"/>
+              </a:rPr>
+              <a:t>%</a:t>
+            </a:r>
+          </a:p>
+          <a:p>
+            <a:r>
+              <a:rPr lang="en-US" sz="1400" dirty="0" smtClean="0">
+                <a:latin typeface="Courier"/>
+                <a:cs typeface="Courier"/>
+              </a:rPr>
+              <a:t>REYNOLDS_NUMBER=1000.0</a:t>
+            </a:r>
+          </a:p>
+          <a:p>
+            <a:r>
+              <a:rPr lang="en-US" sz="1400" dirty="0" smtClean="0">
+                <a:latin typeface="Courier"/>
+                <a:cs typeface="Courier"/>
+              </a:rPr>
+              <a:t>%</a:t>
+            </a:r>
+          </a:p>
+          <a:p>
+            <a:r>
+              <a:rPr lang="en-US" sz="1400" dirty="0" smtClean="0">
+                <a:latin typeface="Courier"/>
+                <a:cs typeface="Courier"/>
+              </a:rPr>
+              <a:t>FREESTREAM_TEMPERATURE= 288.15</a:t>
+            </a:r>
+          </a:p>
+          <a:p>
+            <a:r>
+              <a:rPr lang="en-US" sz="1400" dirty="0" smtClean="0">
+                <a:latin typeface="Courier"/>
+                <a:cs typeface="Courier"/>
+              </a:rPr>
+              <a:t>%</a:t>
+            </a:r>
+          </a:p>
+          <a:p>
+            <a:r>
+              <a:rPr lang="en-US" sz="1400" dirty="0" smtClean="0">
+                <a:latin typeface="Courier"/>
+                <a:cs typeface="Courier"/>
+              </a:rPr>
+              <a:t>MESH_FILENAME</a:t>
+            </a:r>
+            <a:r>
+              <a:rPr lang="en-US" sz="1400" dirty="0">
+                <a:latin typeface="Courier"/>
+                <a:cs typeface="Courier"/>
+              </a:rPr>
+              <a:t>= </a:t>
+            </a:r>
+            <a:r>
+              <a:rPr lang="en-US" sz="1400" dirty="0" smtClean="0">
+                <a:latin typeface="Courier"/>
+                <a:cs typeface="Courier"/>
+              </a:rPr>
+              <a:t>mesh_NACA0012_lam_omesh.su2</a:t>
+            </a:r>
+            <a:endParaRPr lang="en-US" sz="1400" dirty="0">
+              <a:latin typeface="Courier"/>
+              <a:cs typeface="Courier"/>
+            </a:endParaRPr>
+          </a:p>
+        </p:txBody>
+      </p:sp>
+    </p:spTree>
+    <p:custDataLst>
+      <p:tags r:id="rId1"/>
+    </p:custDataLst>
+    <p:extLst>
+      <p:ext uri="{BB962C8B-B14F-4D97-AF65-F5344CB8AC3E}">
+        <p14:creationId xmlns:p14="http://schemas.microsoft.com/office/powerpoint/2010/main" val="2418231388"/>
+      </p:ext>
+    </p:extLst>
+  </p:cSld>
+  <p:clrMapOvr>
+    <a:masterClrMapping/>
+  </p:clrMapOvr>
+  <mc:AlternateContent xmlns:mc="http://schemas.openxmlformats.org/markup-compatibility/2006" xmlns:p14="http://schemas.microsoft.com/office/powerpoint/2010/main">
+    <mc:Choice Requires="p14">
+      <p:transition spd="slow" p14:dur="2000" advTm="104325"/>
+    </mc:Choice>
+    <mc:Fallback xmlns="" xmlns:mv="urn:schemas-microsoft-com:mac:vml">
       <p:transition spd="slow" advTm="104325"/>
     </mc:Fallback>
   </mc:AlternateContent>
@@ -5798,7 +6136,7 @@
           <a:p>
             <a:r>
               <a:rPr lang="en-US" dirty="0" smtClean="0"/>
-              <a:t>Flow Solution</a:t>
+              <a:t>Restart</a:t>
             </a:r>
             <a:endParaRPr lang="en-US" sz="2400" dirty="0"/>
           </a:p>
@@ -5816,7 +6154,7 @@
         </p:nvSpPr>
         <p:spPr>
           <a:xfrm>
-            <a:off x="884238" y="1152026"/>
+            <a:off x="660400" y="1240552"/>
             <a:ext cx="7772400" cy="4800600"/>
           </a:xfrm>
           <a:prstGeom prst="rect">
@@ -5830,6 +6168,12 @@
           <a:lstStyle/>
           <a:p>
             <a:r>
+              <a:rPr lang="en-US" dirty="0"/>
+              <a:t>Simulations can be restarted from partially converged results</a:t>
+            </a:r>
+          </a:p>
+          <a:p>
+            <a:r>
               <a:rPr lang="en-US" dirty="0" err="1"/>
               <a:t>Config</a:t>
             </a:r>
@@ -5837,60 +6181,6 @@
               <a:rPr lang="en-US" dirty="0"/>
               <a:t> options:</a:t>
             </a:r>
-          </a:p>
-          <a:p>
-            <a:endParaRPr lang="en-US" dirty="0"/>
-          </a:p>
-          <a:p>
-            <a:endParaRPr lang="en-US" dirty="0"/>
-          </a:p>
-          <a:p>
-            <a:endParaRPr lang="en-US" dirty="0"/>
-          </a:p>
-          <a:p>
-            <a:endParaRPr lang="en-US" dirty="0"/>
-          </a:p>
-          <a:p>
-            <a:endParaRPr lang="en-US" dirty="0" smtClean="0"/>
-          </a:p>
-          <a:p>
-            <a:endParaRPr lang="en-US" dirty="0"/>
-          </a:p>
-          <a:p>
-            <a:endParaRPr lang="en-US" dirty="0" smtClean="0"/>
-          </a:p>
-          <a:p>
-            <a:endParaRPr lang="en-US" dirty="0"/>
-          </a:p>
-          <a:p>
-            <a:endParaRPr lang="en-US" dirty="0"/>
-          </a:p>
-          <a:p>
-            <a:endParaRPr lang="en-US" dirty="0"/>
-          </a:p>
-          <a:p>
-            <a:endParaRPr lang="en-US" dirty="0"/>
-          </a:p>
-          <a:p>
-            <a:r>
-              <a:rPr lang="en-US" dirty="0"/>
-              <a:t>Most parameters have default values</a:t>
-            </a:r>
-          </a:p>
-          <a:p>
-            <a:r>
-              <a:rPr lang="en-US" dirty="0"/>
-              <a:t>The order of </a:t>
-            </a:r>
-            <a:r>
-              <a:rPr lang="en-US" dirty="0" err="1"/>
-              <a:t>config</a:t>
-            </a:r>
-            <a:r>
-              <a:rPr lang="en-US" dirty="0"/>
-              <a:t> options is not important</a:t>
-            </a:r>
-            <a:endParaRPr lang="en-US" dirty="0"/>
           </a:p>
         </p:txBody>
       </p:sp>
@@ -5902,8 +6192,8 @@
         </p:nvSpPr>
         <p:spPr>
           <a:xfrm>
-            <a:off x="2168013" y="2042160"/>
-            <a:ext cx="5214702" cy="2893100"/>
+            <a:off x="2286000" y="3271520"/>
+            <a:ext cx="4572000" cy="738664"/>
           </a:xfrm>
           <a:prstGeom prst="rect">
             <a:avLst/>
@@ -5931,25 +6221,18 @@
           <a:lstStyle/>
           <a:p>
             <a:r>
+              <a:rPr lang="en-US" sz="1400" dirty="0">
+                <a:latin typeface="Courier"/>
+                <a:cs typeface="Courier"/>
+              </a:rPr>
+              <a:t>RESTART_SOL= </a:t>
+            </a:r>
+            <a:r>
               <a:rPr lang="en-US" sz="1400" dirty="0" smtClean="0">
                 <a:latin typeface="Courier"/>
                 <a:cs typeface="Courier"/>
               </a:rPr>
-              <a:t>PHYSICAL_PROBLEM</a:t>
-            </a:r>
-            <a:r>
-              <a:rPr lang="en-US" sz="1400" dirty="0">
-                <a:latin typeface="Courier"/>
-                <a:cs typeface="Courier"/>
-              </a:rPr>
-              <a:t>= </a:t>
-            </a:r>
-            <a:r>
-              <a:rPr lang="en-US" sz="1400" dirty="0" smtClean="0">
-                <a:latin typeface="Courier"/>
-                <a:cs typeface="Courier"/>
-              </a:rPr>
-              <a:t>NAVIER_STOKES</a:t>
+              <a:t>NO</a:t>
             </a:r>
           </a:p>
           <a:p>
@@ -5967,7 +6250,71 @@
                 <a:latin typeface="Courier"/>
                 <a:cs typeface="Courier"/>
               </a:rPr>
-              <a:t>MATH_PROBLEM= DIRECT</a:t>
+              <a:t>EXT_ITER= </a:t>
+            </a:r>
+            <a:r>
+              <a:rPr lang="en-US" sz="1400" dirty="0" smtClean="0">
+                <a:latin typeface="Courier"/>
+                <a:cs typeface="Courier"/>
+              </a:rPr>
+              <a:t>999999</a:t>
+            </a:r>
+            <a:endParaRPr lang="en-US" sz="1400" dirty="0">
+              <a:latin typeface="Courier"/>
+              <a:cs typeface="Courier"/>
+            </a:endParaRPr>
+          </a:p>
+        </p:txBody>
+      </p:sp>
+      <p:sp>
+        <p:nvSpPr>
+          <p:cNvPr id="8" name="TextBox 7"/>
+          <p:cNvSpPr txBox="1"/>
+          <p:nvPr/>
+        </p:nvSpPr>
+        <p:spPr>
+          <a:xfrm>
+            <a:off x="2286000" y="4521200"/>
+            <a:ext cx="4572000" cy="738664"/>
+          </a:xfrm>
+          <a:prstGeom prst="rect">
+            <a:avLst/>
+          </a:prstGeom>
+          <a:ln/>
+        </p:spPr>
+        <p:style>
+          <a:lnRef idx="1">
+            <a:schemeClr val="dk1"/>
+          </a:lnRef>
+          <a:fillRef idx="2">
+            <a:schemeClr val="dk1"/>
+          </a:fillRef>
+          <a:effectRef idx="1">
+            <a:schemeClr val="dk1"/>
+          </a:effectRef>
+          <a:fontRef idx="minor">
+            <a:schemeClr val="dk1"/>
+          </a:fontRef>
+        </p:style>
+        <p:txBody>
+          <a:bodyPr wrap="square" rtlCol="0">
+            <a:spAutoFit/>
+          </a:bodyPr>
+          <a:lstStyle/>
+          <a:p>
+            <a:r>
+              <a:rPr lang="en-US" sz="1400" dirty="0">
+                <a:latin typeface="Courier"/>
+                <a:cs typeface="Courier"/>
+              </a:rPr>
+              <a:t>RESTART_SOL= </a:t>
+            </a:r>
+            <a:r>
+              <a:rPr lang="en-US" sz="1400" dirty="0" smtClean="0">
+                <a:latin typeface="Courier"/>
+                <a:cs typeface="Courier"/>
+              </a:rPr>
+              <a:t>YES</a:t>
             </a:r>
           </a:p>
           <a:p>
@@ -5981,135 +6328,20 @@
           </a:p>
           <a:p>
             <a:r>
-              <a:rPr lang="en-US" sz="1400" dirty="0" smtClean="0">
+              <a:rPr lang="pl-PL" sz="1400" dirty="0">
                 <a:latin typeface="Courier"/>
                 <a:cs typeface="Courier"/>
               </a:rPr>
-              <a:t>MACH_NUMBER</a:t>
-            </a:r>
-            <a:r>
-              <a:rPr lang="en-US" sz="1400" dirty="0">
+              <a:t>SOLUTION_FLOW_FILENAME= </a:t>
+            </a:r>
+            <a:r>
+              <a:rPr lang="pl-PL" sz="1400" dirty="0" err="1">
                 <a:latin typeface="Courier"/>
                 <a:cs typeface="Courier"/>
               </a:rPr>
-              <a:t>= </a:t>
-            </a:r>
-            <a:r>
-              <a:rPr lang="en-US" sz="1400" dirty="0" smtClean="0">
-                <a:latin typeface="Courier"/>
-                <a:cs typeface="Courier"/>
-              </a:rPr>
-              <a:t>0.5</a:t>
-            </a:r>
-            <a:endParaRPr lang="en-US" sz="1400" dirty="0">
-              <a:latin typeface="Courier"/>
-              <a:cs typeface="Courier"/>
-            </a:endParaRPr>
-          </a:p>
-          <a:p>
-            <a:r>
-              <a:rPr lang="en-US" sz="1400" dirty="0" smtClean="0">
-                <a:latin typeface="Courier"/>
-                <a:cs typeface="Courier"/>
-              </a:rPr>
-              <a:t>%</a:t>
-            </a:r>
-          </a:p>
-          <a:p>
-            <a:r>
-              <a:rPr lang="en-US" sz="1400" dirty="0" err="1" smtClean="0">
-                <a:latin typeface="Courier"/>
-                <a:cs typeface="Courier"/>
-              </a:rPr>
-              <a:t>AoA</a:t>
-            </a:r>
-            <a:r>
-              <a:rPr lang="en-US" sz="1400" dirty="0">
-                <a:latin typeface="Courier"/>
-                <a:cs typeface="Courier"/>
-              </a:rPr>
-              <a:t>= </a:t>
-            </a:r>
-            <a:r>
-              <a:rPr lang="en-US" sz="1400" dirty="0" smtClean="0">
-                <a:latin typeface="Courier"/>
-                <a:cs typeface="Courier"/>
-              </a:rPr>
-              <a:t>1.00</a:t>
-            </a:r>
-            <a:endParaRPr lang="en-US" sz="1400" dirty="0">
-              <a:latin typeface="Courier"/>
-              <a:cs typeface="Courier"/>
-            </a:endParaRPr>
-          </a:p>
-          <a:p>
-            <a:r>
-              <a:rPr lang="en-US" sz="1400" dirty="0" smtClean="0">
-                <a:latin typeface="Courier"/>
-                <a:cs typeface="Courier"/>
-              </a:rPr>
-              <a:t>%</a:t>
-            </a:r>
-          </a:p>
-          <a:p>
-            <a:r>
-              <a:rPr lang="en-US" sz="1400" dirty="0" smtClean="0">
-                <a:latin typeface="Courier"/>
-                <a:cs typeface="Courier"/>
-              </a:rPr>
-              <a:t>REYNOLDS_NUMBER=1000.0</a:t>
-            </a:r>
-          </a:p>
-          <a:p>
-            <a:r>
-              <a:rPr lang="en-US" sz="1400" dirty="0" smtClean="0">
-                <a:latin typeface="Courier"/>
-                <a:cs typeface="Courier"/>
-              </a:rPr>
-              <a:t>%</a:t>
-            </a:r>
-          </a:p>
-          <a:p>
-            <a:r>
-              <a:rPr lang="en-US" sz="1400" dirty="0" smtClean="0">
-                <a:latin typeface="Courier"/>
-                <a:cs typeface="Courier"/>
-              </a:rPr>
-              <a:t>FREESTREAM_TEMPERATURE= 288.15</a:t>
-            </a:r>
-          </a:p>
-          <a:p>
-            <a:r>
-              <a:rPr lang="en-US" sz="1400" dirty="0" smtClean="0">
-                <a:latin typeface="Courier"/>
-                <a:cs typeface="Courier"/>
-              </a:rPr>
-              <a:t>%</a:t>
-            </a:r>
-          </a:p>
-          <a:p>
-            <a:r>
-              <a:rPr lang="en-US" sz="1400" dirty="0" smtClean="0">
-                <a:latin typeface="Courier"/>
-                <a:cs typeface="Courier"/>
-              </a:rPr>
-              <a:t>MESH_FILENAME</a:t>
-            </a:r>
-            <a:r>
-              <a:rPr lang="en-US" sz="1400" dirty="0">
-                <a:latin typeface="Courier"/>
-                <a:cs typeface="Courier"/>
-              </a:rPr>
-              <a:t>= </a:t>
-            </a:r>
-            <a:r>
-              <a:rPr lang="en-US" sz="1400" dirty="0" smtClean="0">
-                <a:latin typeface="Courier"/>
-                <a:cs typeface="Courier"/>
-              </a:rPr>
-              <a:t>mesh_NACA0012_lam_omesh.su2</a:t>
-            </a:r>
-            <a:endParaRPr lang="en-US" sz="1400" dirty="0">
+              <a:t>solution_flow.dat</a:t>
+            </a:r>
+            <a:endParaRPr lang="en-US" sz="1400" dirty="0" smtClean="0">
               <a:latin typeface="Courier"/>
               <a:cs typeface="Courier"/>
             </a:endParaRPr>
@@ -6122,7 +6354,7 @@
     </p:custDataLst>
     <p:extLst>
       <p:ext uri="{BB962C8B-B14F-4D97-AF65-F5344CB8AC3E}">
-        <p14:creationId xmlns:p14="http://schemas.microsoft.com/office/powerpoint/2010/main" val="2418231388"/>
+        <p14:creationId xmlns:p14="http://schemas.microsoft.com/office/powerpoint/2010/main" val="3347099066"/>
       </p:ext>
     </p:extLst>
   </p:cSld>
@@ -6133,7 +6365,7 @@
     <mc:Choice Requires="p14">
       <p:transition spd="slow" p14:dur="2000" advTm="104325"/>
     </mc:Choice>
-    <mc:Fallback xmlns:mv="urn:schemas-microsoft-com:mac:vml" xmlns="">
+    <mc:Fallback xmlns="" xmlns:mv="urn:schemas-microsoft-com:mac:vml">
       <p:transition spd="slow" advTm="104325"/>
     </mc:Fallback>
   </mc:AlternateContent>
@@ -6181,7 +6413,7 @@
           <a:p>
             <a:r>
               <a:rPr lang="en-US" dirty="0" smtClean="0"/>
-              <a:t>Restart</a:t>
+              <a:t>Solver Parameters</a:t>
             </a:r>
             <a:endParaRPr lang="en-US" sz="2400" dirty="0"/>
           </a:p>
@@ -6199,7 +6431,7 @@
         </p:nvSpPr>
         <p:spPr>
           <a:xfrm>
-            <a:off x="660400" y="1240552"/>
+            <a:off x="685800" y="1295400"/>
             <a:ext cx="7772400" cy="4800600"/>
           </a:xfrm>
           <a:prstGeom prst="rect">
@@ -6214,8 +6446,26 @@
           <a:p>
             <a:r>
               <a:rPr lang="en-US" dirty="0"/>
-              <a:t>Simulations can be restarted from partially converged results</a:t>
-            </a:r>
+              <a:t>Among the many options in the </a:t>
+            </a:r>
+            <a:r>
+              <a:rPr lang="en-US" dirty="0" err="1"/>
+              <a:t>config</a:t>
+            </a:r>
+            <a:r>
+              <a:rPr lang="en-US" dirty="0"/>
+              <a:t> file, various parameters exist to modify the solution </a:t>
+            </a:r>
+            <a:r>
+              <a:rPr lang="en-US" dirty="0" smtClean="0"/>
+              <a:t>method</a:t>
+            </a:r>
+          </a:p>
+          <a:p>
+            <a:endParaRPr lang="en-US" dirty="0"/>
+          </a:p>
+          <a:p>
+            <a:endParaRPr lang="en-US" dirty="0"/>
           </a:p>
           <a:p>
             <a:r>
@@ -6226,20 +6476,19 @@
               <a:rPr lang="en-US" dirty="0"/>
               <a:t> options:</a:t>
             </a:r>
-            <a:endParaRPr lang="en-US" dirty="0"/>
-          </a:p>
-        </p:txBody>
-      </p:sp>
-      <p:sp>
-        <p:nvSpPr>
-          <p:cNvPr id="7" name="TextBox 6"/>
+          </a:p>
+        </p:txBody>
+      </p:sp>
+      <p:sp>
+        <p:nvSpPr>
+          <p:cNvPr id="8" name="TextBox 7"/>
           <p:cNvSpPr txBox="1"/>
           <p:nvPr/>
         </p:nvSpPr>
         <p:spPr>
           <a:xfrm>
-            <a:off x="2286000" y="3271520"/>
-            <a:ext cx="4572000" cy="738664"/>
+            <a:off x="2387600" y="3434080"/>
+            <a:ext cx="4348480" cy="2031325"/>
           </a:xfrm>
           <a:prstGeom prst="rect">
             <a:avLst/>
@@ -6271,14 +6520,7 @@
                 <a:latin typeface="Courier"/>
                 <a:cs typeface="Courier"/>
               </a:rPr>
-              <a:t>RESTART_SOL= </a:t>
-            </a:r>
-            <a:r>
-              <a:rPr lang="en-US" sz="1400" dirty="0" smtClean="0">
-                <a:latin typeface="Courier"/>
-                <a:cs typeface="Courier"/>
-              </a:rPr>
-              <a:t>NO</a:t>
+              <a:t>RESTART_SOL= NO</a:t>
             </a:r>
           </a:p>
           <a:p>
@@ -6292,75 +6534,25 @@
           </a:p>
           <a:p>
             <a:r>
+              <a:rPr lang="en-US" sz="1400" dirty="0" smtClean="0">
+                <a:latin typeface="Courier"/>
+                <a:cs typeface="Courier"/>
+              </a:rPr>
+              <a:t>CFL_NUMBER</a:t>
+            </a:r>
+            <a:r>
               <a:rPr lang="en-US" sz="1400" dirty="0">
                 <a:latin typeface="Courier"/>
                 <a:cs typeface="Courier"/>
               </a:rPr>
-              <a:t>EXT_ITER= </a:t>
+              <a:t>= </a:t>
             </a:r>
             <a:r>
               <a:rPr lang="en-US" sz="1400" dirty="0" smtClean="0">
                 <a:latin typeface="Courier"/>
                 <a:cs typeface="Courier"/>
               </a:rPr>
-              <a:t>999999</a:t>
-            </a:r>
-            <a:endParaRPr lang="en-US" sz="1400" dirty="0">
-              <a:latin typeface="Courier"/>
-              <a:cs typeface="Courier"/>
-            </a:endParaRPr>
-          </a:p>
-        </p:txBody>
-      </p:sp>
-      <p:sp>
-        <p:nvSpPr>
-          <p:cNvPr id="8" name="TextBox 7"/>
-          <p:cNvSpPr txBox="1"/>
-          <p:nvPr/>
-        </p:nvSpPr>
-        <p:spPr>
-          <a:xfrm>
-            <a:off x="2286000" y="4521200"/>
-            <a:ext cx="4572000" cy="738664"/>
-          </a:xfrm>
-          <a:prstGeom prst="rect">
-            <a:avLst/>
-          </a:prstGeom>
-          <a:ln/>
-        </p:spPr>
-        <p:style>
-          <a:lnRef idx="1">
-            <a:schemeClr val="dk1"/>
-          </a:lnRef>
-          <a:fillRef idx="2">
-            <a:schemeClr val="dk1"/>
-          </a:fillRef>
-          <a:effectRef idx="1">
-            <a:schemeClr val="dk1"/>
-          </a:effectRef>
-          <a:fontRef idx="minor">
-            <a:schemeClr val="dk1"/>
-          </a:fontRef>
-        </p:style>
-        <p:txBody>
-          <a:bodyPr wrap="square" rtlCol="0">
-            <a:spAutoFit/>
-          </a:bodyPr>
-          <a:lstStyle/>
-          <a:p>
-            <a:r>
-              <a:rPr lang="en-US" sz="1400" dirty="0">
-                <a:latin typeface="Courier"/>
-                <a:cs typeface="Courier"/>
-              </a:rPr>
-              <a:t>RESTART_SOL= </a:t>
-            </a:r>
-            <a:r>
-              <a:rPr lang="en-US" sz="1400" dirty="0" smtClean="0">
-                <a:latin typeface="Courier"/>
-                <a:cs typeface="Courier"/>
-              </a:rPr>
-              <a:t>YES</a:t>
+              <a:t>4.0</a:t>
             </a:r>
           </a:p>
           <a:p>
@@ -6374,20 +6566,77 @@
           </a:p>
           <a:p>
             <a:r>
-              <a:rPr lang="pl-PL" sz="1400" dirty="0">
+              <a:rPr lang="en-US" sz="1400" dirty="0">
                 <a:latin typeface="Courier"/>
                 <a:cs typeface="Courier"/>
               </a:rPr>
-              <a:t>SOLUTION_FLOW_FILENAME= </a:t>
-            </a:r>
-            <a:r>
-              <a:rPr lang="pl-PL" sz="1400" dirty="0" err="1">
+              <a:t>CFL_RAMP= ( </a:t>
+            </a:r>
+            <a:r>
+              <a:rPr lang="en-US" sz="1400" dirty="0" smtClean="0">
                 <a:latin typeface="Courier"/>
                 <a:cs typeface="Courier"/>
               </a:rPr>
-              <a:t>solution_flow.dat</a:t>
-            </a:r>
-            <a:endParaRPr lang="en-US" sz="1400" dirty="0" smtClean="0">
+              <a:t>1.1, 10, </a:t>
+            </a:r>
+            <a:r>
+              <a:rPr lang="en-US" sz="1400" dirty="0">
+                <a:latin typeface="Courier"/>
+                <a:cs typeface="Courier"/>
+              </a:rPr>
+              <a:t>10.0 </a:t>
+            </a:r>
+            <a:r>
+              <a:rPr lang="en-US" sz="1400" dirty="0" smtClean="0">
+                <a:latin typeface="Courier"/>
+                <a:cs typeface="Courier"/>
+              </a:rPr>
+              <a:t>)</a:t>
+            </a:r>
+          </a:p>
+          <a:p>
+            <a:r>
+              <a:rPr lang="en-US" sz="1400" dirty="0" smtClean="0">
+                <a:latin typeface="Courier"/>
+                <a:cs typeface="Courier"/>
+              </a:rPr>
+              <a:t>%</a:t>
+            </a:r>
+          </a:p>
+          <a:p>
+            <a:r>
+              <a:rPr lang="en-US" sz="1400" dirty="0">
+                <a:latin typeface="Courier"/>
+                <a:cs typeface="Courier"/>
+              </a:rPr>
+              <a:t>CONV_NUM_METHOD_FLOW= </a:t>
+            </a:r>
+            <a:r>
+              <a:rPr lang="en-US" sz="1400" dirty="0" smtClean="0">
+                <a:latin typeface="Courier"/>
+                <a:cs typeface="Courier"/>
+              </a:rPr>
+              <a:t>ROE</a:t>
+            </a:r>
+          </a:p>
+          <a:p>
+            <a:r>
+              <a:rPr lang="en-US" sz="1400" dirty="0" smtClean="0">
+                <a:latin typeface="Courier"/>
+                <a:cs typeface="Courier"/>
+              </a:rPr>
+              <a:t>%</a:t>
+            </a:r>
+          </a:p>
+          <a:p>
+            <a:r>
+              <a:rPr lang="en-US" sz="1400" dirty="0" smtClean="0">
+                <a:latin typeface="Courier"/>
+                <a:cs typeface="Courier"/>
+              </a:rPr>
+              <a:t>SPATIAL_ORDER_FLOW= 2ND_ORDER</a:t>
+            </a:r>
+            <a:endParaRPr lang="en-US" sz="1400" dirty="0">
               <a:latin typeface="Courier"/>
               <a:cs typeface="Courier"/>
             </a:endParaRPr>
@@ -6400,7 +6649,7 @@
     </p:custDataLst>
     <p:extLst>
       <p:ext uri="{BB962C8B-B14F-4D97-AF65-F5344CB8AC3E}">
-        <p14:creationId xmlns:p14="http://schemas.microsoft.com/office/powerpoint/2010/main" val="3347099066"/>
+        <p14:creationId xmlns:p14="http://schemas.microsoft.com/office/powerpoint/2010/main" val="2486428541"/>
       </p:ext>
     </p:extLst>
   </p:cSld>
@@ -6411,7 +6660,7 @@
     <mc:Choice Requires="p14">
       <p:transition spd="slow" p14:dur="2000" advTm="104325"/>
     </mc:Choice>
-    <mc:Fallback xmlns:mv="urn:schemas-microsoft-com:mac:vml" xmlns="">
+    <mc:Fallback xmlns="" xmlns:mv="urn:schemas-microsoft-com:mac:vml">
       <p:transition spd="slow" advTm="104325"/>
     </mc:Fallback>
   </mc:AlternateContent>
@@ -6444,7 +6693,7 @@
       </p:grpSpPr>
       <p:sp>
         <p:nvSpPr>
-          <p:cNvPr id="2" name="Título 1"/>
+          <p:cNvPr id="2" name="Title 1"/>
           <p:cNvSpPr>
             <a:spLocks noGrp="1"/>
           </p:cNvSpPr>
@@ -6459,15 +6708,15 @@
           <a:p>
             <a:r>
               <a:rPr lang="en-US" dirty="0" smtClean="0"/>
-              <a:t>Solver Parameters</a:t>
-            </a:r>
-            <a:endParaRPr lang="en-US" sz="2400" dirty="0"/>
-          </a:p>
-        </p:txBody>
-      </p:sp>
-      <p:sp>
-        <p:nvSpPr>
-          <p:cNvPr id="4" name="Content Placeholder 3"/>
+              <a:t>Interactive</a:t>
+            </a:r>
+            <a:endParaRPr lang="en-US" dirty="0"/>
+          </a:p>
+        </p:txBody>
+      </p:sp>
+      <p:sp>
+        <p:nvSpPr>
+          <p:cNvPr id="3" name="Content Placeholder 2"/>
           <p:cNvSpPr>
             <a:spLocks noGrp="1"/>
           </p:cNvSpPr>
@@ -6485,6 +6734,142 @@
           </a:prstGeom>
         </p:spPr>
         <p:txBody>
+          <a:bodyPr/>
+          <a:lstStyle/>
+          <a:p>
+            <a:r>
+              <a:rPr lang="en-US" dirty="0" smtClean="0"/>
+              <a:t>Direct </a:t>
+            </a:r>
+            <a:r>
+              <a:rPr lang="en-US" dirty="0" smtClean="0"/>
+              <a:t>Solution demonstration</a:t>
+            </a:r>
+          </a:p>
+          <a:p>
+            <a:endParaRPr lang="en-US" dirty="0"/>
+          </a:p>
+          <a:p>
+            <a:r>
+              <a:rPr lang="en-US" dirty="0" smtClean="0"/>
+              <a:t>Materials: </a:t>
+            </a:r>
+          </a:p>
+          <a:p>
+            <a:r>
+              <a:rPr lang="en-US" dirty="0">
+                <a:hlinkClick r:id="rId3"/>
+              </a:rPr>
+              <a:t>https://</a:t>
+            </a:r>
+            <a:r>
+              <a:rPr lang="en-US" dirty="0" smtClean="0">
+                <a:hlinkClick r:id="rId3"/>
+              </a:rPr>
+              <a:t>github.com/su2code/Documentation/tree/master/QuickStart_NS/</a:t>
+            </a:r>
+            <a:endParaRPr lang="en-US" dirty="0" smtClean="0"/>
+          </a:p>
+          <a:p>
+            <a:endParaRPr lang="en-US" dirty="0"/>
+          </a:p>
+          <a:p>
+            <a:r>
+              <a:rPr lang="en-US" dirty="0" smtClean="0"/>
+              <a:t>Lam_NACA0012.cfg, mesh_NACA0012_lam_omesh.su2</a:t>
+            </a:r>
+          </a:p>
+          <a:p>
+            <a:endParaRPr lang="en-US" dirty="0"/>
+          </a:p>
+          <a:p>
+            <a:endParaRPr lang="en-US" dirty="0"/>
+          </a:p>
+          <a:p>
+            <a:endParaRPr lang="en-US" dirty="0"/>
+          </a:p>
+        </p:txBody>
+      </p:sp>
+    </p:spTree>
+    <p:extLst>
+      <p:ext uri="{BB962C8B-B14F-4D97-AF65-F5344CB8AC3E}">
+        <p14:creationId xmlns:p14="http://schemas.microsoft.com/office/powerpoint/2010/main" val="1752753115"/>
+      </p:ext>
+    </p:extLst>
+  </p:cSld>
+  <p:clrMapOvr>
+    <a:masterClrMapping/>
+  </p:clrMapOvr>
+  <p:transition spd="slow">
+    <p:fade/>
+  </p:transition>
+</p:sld>
+</file>
+
+<file path=ppt/slides/slide9.xml><?xml version="1.0" encoding="utf-8"?>
+<p:sld xmlns:a="http://schemas.openxmlformats.org/drawingml/2006/main" xmlns:r="http://schemas.openxmlformats.org/officeDocument/2006/relationships" xmlns:p="http://schemas.openxmlformats.org/presentationml/2006/main">
+  <p:cSld>
+    <p:spTree>
+      <p:nvGrpSpPr>
+        <p:cNvPr id="1" name=""/>
+        <p:cNvGrpSpPr/>
+        <p:nvPr/>
+      </p:nvGrpSpPr>
+      <p:grpSpPr>
+        <a:xfrm>
+          <a:off x="0" y="0"/>
+          <a:ext cx="0" cy="0"/>
+          <a:chOff x="0" y="0"/>
+          <a:chExt cx="0" cy="0"/>
+        </a:xfrm>
+      </p:grpSpPr>
+      <p:sp>
+        <p:nvSpPr>
+          <p:cNvPr id="2" name="Título 1"/>
+          <p:cNvSpPr>
+            <a:spLocks noGrp="1"/>
+          </p:cNvSpPr>
+          <p:nvPr>
+            <p:ph type="title"/>
+          </p:nvPr>
+        </p:nvSpPr>
+        <p:spPr/>
+        <p:txBody>
+          <a:bodyPr/>
+          <a:lstStyle/>
+          <a:p>
+            <a:r>
+              <a:rPr lang="en-US" dirty="0" err="1" smtClean="0"/>
+              <a:t>Adjoint</a:t>
+            </a:r>
+            <a:r>
+              <a:rPr lang="en-US" dirty="0" smtClean="0"/>
+              <a:t> Solution</a:t>
+            </a:r>
+            <a:endParaRPr lang="en-US" sz="2400" dirty="0"/>
+          </a:p>
+        </p:txBody>
+      </p:sp>
+      <p:sp>
+        <p:nvSpPr>
+          <p:cNvPr id="4" name="Content Placeholder 3"/>
+          <p:cNvSpPr>
+            <a:spLocks noGrp="1"/>
+          </p:cNvSpPr>
+          <p:nvPr>
+            <p:ph idx="4294967295"/>
+          </p:nvPr>
+        </p:nvSpPr>
+        <p:spPr>
+          <a:xfrm>
+            <a:off x="685800" y="1295400"/>
+            <a:ext cx="7772400" cy="4800600"/>
+          </a:xfrm>
+          <a:prstGeom prst="rect">
+            <a:avLst/>
+          </a:prstGeom>
+        </p:spPr>
+        <p:txBody>
           <a:bodyPr vert="horz" lIns="0" tIns="45720" rIns="0" bIns="45720" rtlCol="0">
             <a:normAutofit/>
           </a:bodyPr>
@@ -6492,26 +6877,33 @@
           <a:p>
             <a:r>
               <a:rPr lang="en-US" dirty="0"/>
-              <a:t>Among the many options in the </a:t>
-            </a:r>
-            <a:r>
-              <a:rPr lang="en-US" dirty="0" err="1"/>
-              <a:t>config</a:t>
-            </a:r>
+              <a:t>Sensitivity of a functional to changes in the flow</a:t>
+            </a:r>
+          </a:p>
+          <a:p>
+            <a:pPr lvl="1"/>
             <a:r>
               <a:rPr lang="en-US" dirty="0"/>
-              <a:t> file, various parameters exist to modify the solution </a:t>
+              <a:t>e.g., How does changing the airfoil shape affect </a:t>
             </a:r>
             <a:r>
               <a:rPr lang="en-US" dirty="0" smtClean="0"/>
-              <a:t>method</a:t>
-            </a:r>
-          </a:p>
-          <a:p>
+              <a:t>drag?</a:t>
+            </a:r>
             <a:endParaRPr lang="en-US" dirty="0"/>
           </a:p>
           <a:p>
-            <a:endParaRPr lang="en-US" dirty="0"/>
+            <a:r>
+              <a:rPr lang="en-US" dirty="0"/>
+              <a:t>Additional required file:</a:t>
+            </a:r>
+          </a:p>
+          <a:p>
+            <a:pPr lvl="1"/>
+            <a:r>
+              <a:rPr lang="en-US" dirty="0"/>
+              <a:t>Converged flow solution</a:t>
+            </a:r>
           </a:p>
           <a:p>
             <a:r>
@@ -6523,18 +6915,21 @@
               <a:t> options:</a:t>
             </a:r>
           </a:p>
-        </p:txBody>
-      </p:sp>
-      <p:sp>
-        <p:nvSpPr>
-          <p:cNvPr id="8" name="TextBox 7"/>
+          <a:p>
+            <a:endParaRPr lang="en-US" dirty="0"/>
+          </a:p>
+        </p:txBody>
+      </p:sp>
+      <p:sp>
+        <p:nvSpPr>
+          <p:cNvPr id="7" name="TextBox 6"/>
           <p:cNvSpPr txBox="1"/>
           <p:nvPr/>
         </p:nvSpPr>
         <p:spPr>
           <a:xfrm>
-            <a:off x="2387600" y="3434080"/>
-            <a:ext cx="4348480" cy="2031325"/>
+            <a:off x="2245360" y="3269226"/>
+            <a:ext cx="4663440" cy="1600438"/>
           </a:xfrm>
           <a:prstGeom prst="rect">
             <a:avLst/>
@@ -6566,7 +6961,14 @@
                 <a:latin typeface="Courier"/>
                 <a:cs typeface="Courier"/>
               </a:rPr>
-              <a:t>RESTART_SOL= NO</a:t>
+              <a:t>MATH_PROBLEM= </a:t>
+            </a:r>
+            <a:r>
+              <a:rPr lang="en-US" sz="1400" dirty="0" smtClean="0">
+                <a:latin typeface="Courier"/>
+                <a:cs typeface="Courier"/>
+              </a:rPr>
+              <a:t>ADJOINT</a:t>
             </a:r>
           </a:p>
           <a:p>
@@ -6580,25 +6982,11 @@
           </a:p>
           <a:p>
             <a:r>
-              <a:rPr lang="en-US" sz="1400" dirty="0" smtClean="0">
-                <a:latin typeface="Courier"/>
-                <a:cs typeface="Courier"/>
-              </a:rPr>
-              <a:t>CFL_NUMBER</a:t>
-            </a:r>
-            <a:r>
               <a:rPr lang="en-US" sz="1400" dirty="0">
                 <a:latin typeface="Courier"/>
                 <a:cs typeface="Courier"/>
               </a:rPr>
-              <a:t>= </a:t>
-            </a:r>
-            <a:r>
-              <a:rPr lang="en-US" sz="1400" dirty="0" smtClean="0">
-                <a:latin typeface="Courier"/>
-                <a:cs typeface="Courier"/>
-              </a:rPr>
-              <a:t>4.0</a:t>
+              <a:t>RESTART_SOL= NO</a:t>
             </a:r>
           </a:p>
           <a:p>
@@ -6609,35 +6997,25 @@
               </a:rPr>
               <a:t>%</a:t>
             </a:r>
-          </a:p>
-          <a:p>
-            <a:r>
-              <a:rPr lang="en-US" sz="1400" dirty="0">
+            <a:endParaRPr lang="en-US" sz="1400" dirty="0">
+              <a:latin typeface="Courier"/>
+              <a:cs typeface="Courier"/>
+            </a:endParaRPr>
+          </a:p>
+          <a:p>
+            <a:r>
+              <a:rPr lang="en-US" sz="1400" smtClean="0">
                 <a:latin typeface="Courier"/>
                 <a:cs typeface="Courier"/>
               </a:rPr>
-              <a:t>CFL_RAMP= ( </a:t>
+              <a:t>OBJECTIVE_FUNCTION= </a:t>
             </a:r>
             <a:r>
               <a:rPr lang="en-US" sz="1400" dirty="0" smtClean="0">
                 <a:latin typeface="Courier"/>
                 <a:cs typeface="Courier"/>
               </a:rPr>
-              <a:t>1.1, 10, </a:t>
-            </a:r>
-            <a:r>
-              <a:rPr lang="en-US" sz="1400" dirty="0">
-                <a:latin typeface="Courier"/>
-                <a:cs typeface="Courier"/>
-              </a:rPr>
-              <a:t>10.0 </a:t>
-            </a:r>
-            <a:r>
-              <a:rPr lang="en-US" sz="1400" dirty="0" smtClean="0">
-                <a:latin typeface="Courier"/>
-                <a:cs typeface="Courier"/>
-              </a:rPr>
-              <a:t>)</a:t>
+              <a:t>DRAG</a:t>
             </a:r>
           </a:p>
           <a:p>
@@ -6651,38 +7029,20 @@
           </a:p>
           <a:p>
             <a:r>
-              <a:rPr lang="en-US" sz="1400" dirty="0">
+              <a:rPr lang="pl-PL" sz="1400" dirty="0">
                 <a:latin typeface="Courier"/>
                 <a:cs typeface="Courier"/>
               </a:rPr>
-              <a:t>CONV_NUM_METHOD_FLOW= </a:t>
-            </a:r>
-            <a:r>
-              <a:rPr lang="en-US" sz="1400" dirty="0" smtClean="0">
+              <a:t>SOLUTION_FLOW_FILENAME= </a:t>
+            </a:r>
+            <a:r>
+              <a:rPr lang="pl-PL" sz="1400" dirty="0" err="1" smtClean="0">
                 <a:latin typeface="Courier"/>
                 <a:cs typeface="Courier"/>
               </a:rPr>
-              <a:t>ROE</a:t>
-            </a:r>
-          </a:p>
-          <a:p>
-            <a:r>
-              <a:rPr lang="en-US" sz="1400" dirty="0" smtClean="0">
-                <a:latin typeface="Courier"/>
-                <a:cs typeface="Courier"/>
-              </a:rPr>
-              <a:t>%</a:t>
-            </a:r>
-          </a:p>
-          <a:p>
-            <a:r>
-              <a:rPr lang="en-US" sz="1400" dirty="0" smtClean="0">
-                <a:latin typeface="Courier"/>
-                <a:cs typeface="Courier"/>
-              </a:rPr>
-              <a:t>SPATIAL_ORDER_FLOW= 2ND_ORDER</a:t>
-            </a:r>
-            <a:endParaRPr lang="en-US" sz="1400" dirty="0">
+              <a:t>solution_flow.dat</a:t>
+            </a:r>
+            <a:endParaRPr lang="pl-PL" sz="1400" dirty="0">
               <a:latin typeface="Courier"/>
               <a:cs typeface="Courier"/>
             </a:endParaRPr>
@@ -6695,7 +7055,7 @@
     </p:custDataLst>
     <p:extLst>
       <p:ext uri="{BB962C8B-B14F-4D97-AF65-F5344CB8AC3E}">
-        <p14:creationId xmlns:p14="http://schemas.microsoft.com/office/powerpoint/2010/main" val="2486428541"/>
+        <p14:creationId xmlns:p14="http://schemas.microsoft.com/office/powerpoint/2010/main" val="1792451415"/>
       </p:ext>
     </p:extLst>
   </p:cSld>
@@ -6706,7 +7066,7 @@
     <mc:Choice Requires="p14">
       <p:transition spd="slow" p14:dur="2000" advTm="104325"/>
     </mc:Choice>
-    <mc:Fallback xmlns:mv="urn:schemas-microsoft-com:mac:vml" xmlns="">
+    <mc:Fallback xmlns="" xmlns:mv="urn:schemas-microsoft-com:mac:vml">
       <p:transition spd="slow" advTm="104325"/>
     </mc:Fallback>
   </mc:AlternateContent>
@@ -6717,93 +7077,6 @@
       </p:par>
     </p:tnLst>
   </p:timing>
-</p:sld>
-</file>
-
-<file path=ppt/slides/slide9.xml><?xml version="1.0" encoding="utf-8"?>
-<p:sld xmlns:a="http://schemas.openxmlformats.org/drawingml/2006/main" xmlns:r="http://schemas.openxmlformats.org/officeDocument/2006/relationships" xmlns:p="http://schemas.openxmlformats.org/presentationml/2006/main">
-  <p:cSld>
-    <p:spTree>
-      <p:nvGrpSpPr>
-        <p:cNvPr id="1" name=""/>
-        <p:cNvGrpSpPr/>
-        <p:nvPr/>
-      </p:nvGrpSpPr>
-      <p:grpSpPr>
-        <a:xfrm>
-          <a:off x="0" y="0"/>
-          <a:ext cx="0" cy="0"/>
-          <a:chOff x="0" y="0"/>
-          <a:chExt cx="0" cy="0"/>
-        </a:xfrm>
-      </p:grpSpPr>
-      <p:sp>
-        <p:nvSpPr>
-          <p:cNvPr id="2" name="Title 1"/>
-          <p:cNvSpPr>
-            <a:spLocks noGrp="1"/>
-          </p:cNvSpPr>
-          <p:nvPr>
-            <p:ph type="title"/>
-          </p:nvPr>
-        </p:nvSpPr>
-        <p:spPr/>
-        <p:txBody>
-          <a:bodyPr/>
-          <a:lstStyle/>
-          <a:p>
-            <a:r>
-              <a:rPr lang="en-US" dirty="0" smtClean="0"/>
-              <a:t>Interactive</a:t>
-            </a:r>
-            <a:endParaRPr lang="en-US" dirty="0"/>
-          </a:p>
-        </p:txBody>
-      </p:sp>
-      <p:sp>
-        <p:nvSpPr>
-          <p:cNvPr id="3" name="Content Placeholder 2"/>
-          <p:cNvSpPr>
-            <a:spLocks noGrp="1"/>
-          </p:cNvSpPr>
-          <p:nvPr>
-            <p:ph idx="4294967295"/>
-          </p:nvPr>
-        </p:nvSpPr>
-        <p:spPr>
-          <a:xfrm>
-            <a:off x="685800" y="1295400"/>
-            <a:ext cx="7772400" cy="4800600"/>
-          </a:xfrm>
-          <a:prstGeom prst="rect">
-            <a:avLst/>
-          </a:prstGeom>
-        </p:spPr>
-        <p:txBody>
-          <a:bodyPr/>
-          <a:lstStyle/>
-          <a:p>
-            <a:r>
-              <a:rPr lang="en-US" dirty="0" smtClean="0"/>
-              <a:t>Direct Solution</a:t>
-            </a:r>
-            <a:endParaRPr lang="en-US" dirty="0"/>
-          </a:p>
-        </p:txBody>
-      </p:sp>
-    </p:spTree>
-    <p:extLst>
-      <p:ext uri="{BB962C8B-B14F-4D97-AF65-F5344CB8AC3E}">
-        <p14:creationId xmlns:p14="http://schemas.microsoft.com/office/powerpoint/2010/main" val="1752753115"/>
-      </p:ext>
-    </p:extLst>
-  </p:cSld>
-  <p:clrMapOvr>
-    <a:masterClrMapping/>
-  </p:clrMapOvr>
-  <p:transition spd="slow">
-    <p:fade/>
-  </p:transition>
 </p:sld>
 </file>
 

</xml_diff>